<commit_message>
not sure what this us, but leftover stuff to commit i guess
</commit_message>
<xml_diff>
--- a/_site/figures.pptx
+++ b/_site/figures.pptx
@@ -9,6 +9,9 @@
     <p:sldId id="257" r:id="rId3"/>
     <p:sldId id="258" r:id="rId4"/>
     <p:sldId id="259" r:id="rId5"/>
+    <p:sldId id="260" r:id="rId6"/>
+    <p:sldId id="261" r:id="rId7"/>
+    <p:sldId id="262" r:id="rId8"/>
   </p:sldIdLst>
   <p:sldSz cx="9144000" cy="6858000" type="screen4x3"/>
   <p:notesSz cx="6858000" cy="9144000"/>
@@ -3164,7 +3167,7 @@
           <a:graphicData uri="http://schemas.openxmlformats.org/presentationml/2006/ole">
             <mc:AlternateContent xmlns:mc="http://schemas.openxmlformats.org/markup-compatibility/2006">
               <mc:Choice xmlns:v="urn:schemas-microsoft-com:vml" Requires="v">
-                <p:oleObj spid="_x0000_s1056" name="Equation" r:id="rId3" imgW="139700" imgH="203200" progId="Equation.3">
+                <p:oleObj spid="_x0000_s1064" name="Equation" r:id="rId3" imgW="139700" imgH="203200" progId="Equation.3">
                   <p:embed/>
                 </p:oleObj>
               </mc:Choice>
@@ -3480,7 +3483,7 @@
           <a:graphicData uri="http://schemas.openxmlformats.org/presentationml/2006/ole">
             <mc:AlternateContent xmlns:mc="http://schemas.openxmlformats.org/markup-compatibility/2006">
               <mc:Choice xmlns:v="urn:schemas-microsoft-com:vml" Requires="v">
-                <p:oleObj spid="_x0000_s1057" name="Equation" r:id="rId5" imgW="152400" imgH="203200" progId="Equation.3">
+                <p:oleObj spid="_x0000_s1065" name="Equation" r:id="rId5" imgW="152400" imgH="203200" progId="Equation.3">
                   <p:embed/>
                 </p:oleObj>
               </mc:Choice>
@@ -3537,7 +3540,7 @@
           <a:graphicData uri="http://schemas.openxmlformats.org/presentationml/2006/ole">
             <mc:AlternateContent xmlns:mc="http://schemas.openxmlformats.org/markup-compatibility/2006">
               <mc:Choice xmlns:v="urn:schemas-microsoft-com:vml" Requires="v">
-                <p:oleObj spid="_x0000_s1058" name="Equation" r:id="rId7" imgW="177800" imgH="203200" progId="Equation.3">
+                <p:oleObj spid="_x0000_s1066" name="Equation" r:id="rId7" imgW="177800" imgH="203200" progId="Equation.3">
                   <p:embed/>
                 </p:oleObj>
               </mc:Choice>
@@ -3594,7 +3597,7 @@
           <a:graphicData uri="http://schemas.openxmlformats.org/presentationml/2006/ole">
             <mc:AlternateContent xmlns:mc="http://schemas.openxmlformats.org/markup-compatibility/2006">
               <mc:Choice xmlns:v="urn:schemas-microsoft-com:vml" Requires="v">
-                <p:oleObj spid="_x0000_s1059" name="Equation" r:id="rId9" imgW="177800" imgH="215900" progId="Equation.3">
+                <p:oleObj spid="_x0000_s1067" name="Equation" r:id="rId9" imgW="177800" imgH="215900" progId="Equation.3">
                   <p:embed/>
                 </p:oleObj>
               </mc:Choice>
@@ -3651,7 +3654,7 @@
           <a:graphicData uri="http://schemas.openxmlformats.org/presentationml/2006/ole">
             <mc:AlternateContent xmlns:mc="http://schemas.openxmlformats.org/markup-compatibility/2006">
               <mc:Choice xmlns:v="urn:schemas-microsoft-com:vml" Requires="v">
-                <p:oleObj spid="_x0000_s1060" name="Equation" r:id="rId11" imgW="127000" imgH="165100" progId="Equation.3">
+                <p:oleObj spid="_x0000_s1068" name="Equation" r:id="rId11" imgW="127000" imgH="165100" progId="Equation.3">
                   <p:embed/>
                 </p:oleObj>
               </mc:Choice>
@@ -3753,7 +3756,7 @@
           <a:graphicData uri="http://schemas.openxmlformats.org/presentationml/2006/ole">
             <mc:AlternateContent xmlns:mc="http://schemas.openxmlformats.org/markup-compatibility/2006">
               <mc:Choice xmlns:v="urn:schemas-microsoft-com:vml" Requires="v">
-                <p:oleObj spid="_x0000_s1061" name="Equation" r:id="rId13" imgW="177800" imgH="203200" progId="Equation.3">
+                <p:oleObj spid="_x0000_s1069" name="Equation" r:id="rId13" imgW="177800" imgH="203200" progId="Equation.3">
                   <p:embed/>
                 </p:oleObj>
               </mc:Choice>
@@ -3938,7 +3941,7 @@
           <a:graphicData uri="http://schemas.openxmlformats.org/presentationml/2006/ole">
             <mc:AlternateContent xmlns:mc="http://schemas.openxmlformats.org/markup-compatibility/2006">
               <mc:Choice xmlns:v="urn:schemas-microsoft-com:vml" Requires="v">
-                <p:oleObj spid="_x0000_s1062" name="Equation" r:id="rId15" imgW="203200" imgH="203200" progId="Equation.3">
+                <p:oleObj spid="_x0000_s1070" name="Equation" r:id="rId15" imgW="203200" imgH="203200" progId="Equation.3">
                   <p:embed/>
                 </p:oleObj>
               </mc:Choice>
@@ -3997,7 +4000,7 @@
           <a:graphicData uri="http://schemas.openxmlformats.org/presentationml/2006/ole">
             <mc:AlternateContent xmlns:mc="http://schemas.openxmlformats.org/markup-compatibility/2006">
               <mc:Choice xmlns:v="urn:schemas-microsoft-com:vml" Requires="v">
-                <p:oleObj spid="_x0000_s1063" name="Equation" r:id="rId17" imgW="203200" imgH="215900" progId="Equation.3">
+                <p:oleObj spid="_x0000_s1071" name="Equation" r:id="rId17" imgW="203200" imgH="215900" progId="Equation.3">
                   <p:embed/>
                 </p:oleObj>
               </mc:Choice>
@@ -4117,7 +4120,7 @@
           <a:graphicData uri="http://schemas.openxmlformats.org/presentationml/2006/ole">
             <mc:AlternateContent xmlns:mc="http://schemas.openxmlformats.org/markup-compatibility/2006">
               <mc:Choice xmlns:v="urn:schemas-microsoft-com:vml" Requires="v">
-                <p:oleObj spid="_x0000_s2058" name="Equation" r:id="rId4" imgW="127000" imgH="165100" progId="Equation.3">
+                <p:oleObj spid="_x0000_s2062" name="Equation" r:id="rId4" imgW="127000" imgH="165100" progId="Equation.3">
                   <p:embed/>
                 </p:oleObj>
               </mc:Choice>
@@ -4174,7 +4177,7 @@
           <a:graphicData uri="http://schemas.openxmlformats.org/presentationml/2006/ole">
             <mc:AlternateContent xmlns:mc="http://schemas.openxmlformats.org/markup-compatibility/2006">
               <mc:Choice xmlns:v="urn:schemas-microsoft-com:vml" Requires="v">
-                <p:oleObj spid="_x0000_s2059" name="Equation" r:id="rId6" imgW="114300" imgH="139700" progId="Equation.3">
+                <p:oleObj spid="_x0000_s2063" name="Equation" r:id="rId6" imgW="114300" imgH="139700" progId="Equation.3">
                   <p:embed/>
                 </p:oleObj>
               </mc:Choice>
@@ -4231,7 +4234,7 @@
           <a:graphicData uri="http://schemas.openxmlformats.org/presentationml/2006/ole">
             <mc:AlternateContent xmlns:mc="http://schemas.openxmlformats.org/markup-compatibility/2006">
               <mc:Choice xmlns:v="urn:schemas-microsoft-com:vml" Requires="v">
-                <p:oleObj spid="_x0000_s2060" name="Equation" r:id="rId8" imgW="1574800" imgH="215900" progId="Equation.3">
+                <p:oleObj spid="_x0000_s2064" name="Equation" r:id="rId8" imgW="1574800" imgH="215900" progId="Equation.3">
                   <p:embed/>
                 </p:oleObj>
               </mc:Choice>
@@ -4288,7 +4291,7 @@
           <a:graphicData uri="http://schemas.openxmlformats.org/presentationml/2006/ole">
             <mc:AlternateContent xmlns:mc="http://schemas.openxmlformats.org/markup-compatibility/2006">
               <mc:Choice xmlns:v="urn:schemas-microsoft-com:vml" Requires="v">
-                <p:oleObj spid="_x0000_s2061" name="Equation" r:id="rId10" imgW="647700" imgH="393700" progId="Equation.3">
+                <p:oleObj spid="_x0000_s2065" name="Equation" r:id="rId10" imgW="647700" imgH="393700" progId="Equation.3">
                   <p:embed/>
                 </p:oleObj>
               </mc:Choice>
@@ -5610,7 +5613,7 @@
           <p:nvPr>
             <p:extLst>
               <p:ext uri="{D42A27DB-BD31-4B8C-83A1-F6EECF244321}">
-                <p14:modId xmlns:p14="http://schemas.microsoft.com/office/powerpoint/2010/main" val="1295657055"/>
+                <p14:modId xmlns:p14="http://schemas.microsoft.com/office/powerpoint/2010/main" val="2953933404"/>
               </p:ext>
             </p:extLst>
           </p:nvPr>
@@ -5623,7 +5626,7 @@
           <a:graphicData uri="http://schemas.openxmlformats.org/presentationml/2006/ole">
             <mc:AlternateContent xmlns:mc="http://schemas.openxmlformats.org/markup-compatibility/2006">
               <mc:Choice xmlns:v="urn:schemas-microsoft-com:vml" Requires="v">
-                <p:oleObj spid="_x0000_s3231" name="Equation" r:id="rId3" imgW="254000" imgH="241300" progId="Equation.3">
+                <p:oleObj spid="_x0000_s3332" name="Equation" r:id="rId3" imgW="254000" imgH="241300" progId="Equation.3">
                   <p:embed/>
                 </p:oleObj>
               </mc:Choice>
@@ -5759,7 +5762,7 @@
           <p:nvPr>
             <p:extLst>
               <p:ext uri="{D42A27DB-BD31-4B8C-83A1-F6EECF244321}">
-                <p14:modId xmlns:p14="http://schemas.microsoft.com/office/powerpoint/2010/main" val="4160982209"/>
+                <p14:modId xmlns:p14="http://schemas.microsoft.com/office/powerpoint/2010/main" val="3519837294"/>
               </p:ext>
             </p:extLst>
           </p:nvPr>
@@ -5772,7 +5775,7 @@
           <a:graphicData uri="http://schemas.openxmlformats.org/presentationml/2006/ole">
             <mc:AlternateContent xmlns:mc="http://schemas.openxmlformats.org/markup-compatibility/2006">
               <mc:Choice xmlns:v="urn:schemas-microsoft-com:vml" Requires="v">
-                <p:oleObj spid="_x0000_s3232" name="Equation" r:id="rId5" imgW="254000" imgH="241300" progId="Equation.3">
+                <p:oleObj spid="_x0000_s3333" name="Equation" r:id="rId5" imgW="254000" imgH="241300" progId="Equation.3">
                   <p:embed/>
                 </p:oleObj>
               </mc:Choice>
@@ -5863,7 +5866,7 @@
           <p:nvPr>
             <p:extLst>
               <p:ext uri="{D42A27DB-BD31-4B8C-83A1-F6EECF244321}">
-                <p14:modId xmlns:p14="http://schemas.microsoft.com/office/powerpoint/2010/main" val="1708519182"/>
+                <p14:modId xmlns:p14="http://schemas.microsoft.com/office/powerpoint/2010/main" val="3537293595"/>
               </p:ext>
             </p:extLst>
           </p:nvPr>
@@ -5876,7 +5879,7 @@
           <a:graphicData uri="http://schemas.openxmlformats.org/presentationml/2006/ole">
             <mc:AlternateContent xmlns:mc="http://schemas.openxmlformats.org/markup-compatibility/2006">
               <mc:Choice xmlns:v="urn:schemas-microsoft-com:vml" Requires="v">
-                <p:oleObj spid="_x0000_s3233" name="Equation" r:id="rId7" imgW="254000" imgH="241300" progId="Equation.3">
+                <p:oleObj spid="_x0000_s3334" name="Equation" r:id="rId7" imgW="254000" imgH="241300" progId="Equation.3">
                   <p:embed/>
                 </p:oleObj>
               </mc:Choice>
@@ -5967,7 +5970,7 @@
           <p:nvPr>
             <p:extLst>
               <p:ext uri="{D42A27DB-BD31-4B8C-83A1-F6EECF244321}">
-                <p14:modId xmlns:p14="http://schemas.microsoft.com/office/powerpoint/2010/main" val="718506332"/>
+                <p14:modId xmlns:p14="http://schemas.microsoft.com/office/powerpoint/2010/main" val="3728181363"/>
               </p:ext>
             </p:extLst>
           </p:nvPr>
@@ -5980,7 +5983,7 @@
           <a:graphicData uri="http://schemas.openxmlformats.org/presentationml/2006/ole">
             <mc:AlternateContent xmlns:mc="http://schemas.openxmlformats.org/markup-compatibility/2006">
               <mc:Choice xmlns:v="urn:schemas-microsoft-com:vml" Requires="v">
-                <p:oleObj spid="_x0000_s3234" name="Equation" r:id="rId9" imgW="266700" imgH="241300" progId="Equation.3">
+                <p:oleObj spid="_x0000_s3335" name="Equation" r:id="rId9" imgW="266700" imgH="241300" progId="Equation.3">
                   <p:embed/>
                 </p:oleObj>
               </mc:Choice>
@@ -6071,7 +6074,7 @@
           <p:nvPr>
             <p:extLst>
               <p:ext uri="{D42A27DB-BD31-4B8C-83A1-F6EECF244321}">
-                <p14:modId xmlns:p14="http://schemas.microsoft.com/office/powerpoint/2010/main" val="470071149"/>
+                <p14:modId xmlns:p14="http://schemas.microsoft.com/office/powerpoint/2010/main" val="3151120491"/>
               </p:ext>
             </p:extLst>
           </p:nvPr>
@@ -6084,7 +6087,7 @@
           <a:graphicData uri="http://schemas.openxmlformats.org/presentationml/2006/ole">
             <mc:AlternateContent xmlns:mc="http://schemas.openxmlformats.org/markup-compatibility/2006">
               <mc:Choice xmlns:v="urn:schemas-microsoft-com:vml" Requires="v">
-                <p:oleObj spid="_x0000_s3235" name="Equation" r:id="rId11" imgW="266700" imgH="241300" progId="Equation.3">
+                <p:oleObj spid="_x0000_s3336" name="Equation" r:id="rId11" imgW="266700" imgH="241300" progId="Equation.3">
                   <p:embed/>
                 </p:oleObj>
               </mc:Choice>
@@ -6175,7 +6178,7 @@
           <p:nvPr>
             <p:extLst>
               <p:ext uri="{D42A27DB-BD31-4B8C-83A1-F6EECF244321}">
-                <p14:modId xmlns:p14="http://schemas.microsoft.com/office/powerpoint/2010/main" val="1643886058"/>
+                <p14:modId xmlns:p14="http://schemas.microsoft.com/office/powerpoint/2010/main" val="66486166"/>
               </p:ext>
             </p:extLst>
           </p:nvPr>
@@ -6188,7 +6191,7 @@
           <a:graphicData uri="http://schemas.openxmlformats.org/presentationml/2006/ole">
             <mc:AlternateContent xmlns:mc="http://schemas.openxmlformats.org/markup-compatibility/2006">
               <mc:Choice xmlns:v="urn:schemas-microsoft-com:vml" Requires="v">
-                <p:oleObj spid="_x0000_s3236" name="Equation" r:id="rId13" imgW="254000" imgH="241300" progId="Equation.3">
+                <p:oleObj spid="_x0000_s3337" name="Equation" r:id="rId13" imgW="254000" imgH="241300" progId="Equation.3">
                   <p:embed/>
                 </p:oleObj>
               </mc:Choice>
@@ -6324,7 +6327,7 @@
           <p:nvPr>
             <p:extLst>
               <p:ext uri="{D42A27DB-BD31-4B8C-83A1-F6EECF244321}">
-                <p14:modId xmlns:p14="http://schemas.microsoft.com/office/powerpoint/2010/main" val="1198923735"/>
+                <p14:modId xmlns:p14="http://schemas.microsoft.com/office/powerpoint/2010/main" val="63440654"/>
               </p:ext>
             </p:extLst>
           </p:nvPr>
@@ -6337,7 +6340,7 @@
           <a:graphicData uri="http://schemas.openxmlformats.org/presentationml/2006/ole">
             <mc:AlternateContent xmlns:mc="http://schemas.openxmlformats.org/markup-compatibility/2006">
               <mc:Choice xmlns:v="urn:schemas-microsoft-com:vml" Requires="v">
-                <p:oleObj spid="_x0000_s3237" name="Equation" r:id="rId15" imgW="266700" imgH="241300" progId="Equation.3">
+                <p:oleObj spid="_x0000_s3338" name="Equation" r:id="rId15" imgW="266700" imgH="241300" progId="Equation.3">
                   <p:embed/>
                 </p:oleObj>
               </mc:Choice>
@@ -6383,7 +6386,7 @@
           <p:nvPr>
             <p:extLst>
               <p:ext uri="{D42A27DB-BD31-4B8C-83A1-F6EECF244321}">
-                <p14:modId xmlns:p14="http://schemas.microsoft.com/office/powerpoint/2010/main" val="200214452"/>
+                <p14:modId xmlns:p14="http://schemas.microsoft.com/office/powerpoint/2010/main" val="397478008"/>
               </p:ext>
             </p:extLst>
           </p:nvPr>
@@ -6396,7 +6399,7 @@
           <a:graphicData uri="http://schemas.openxmlformats.org/presentationml/2006/ole">
             <mc:AlternateContent xmlns:mc="http://schemas.openxmlformats.org/markup-compatibility/2006">
               <mc:Choice xmlns:v="urn:schemas-microsoft-com:vml" Requires="v">
-                <p:oleObj spid="_x0000_s3238" name="Equation" r:id="rId17" imgW="254000" imgH="241300" progId="Equation.3">
+                <p:oleObj spid="_x0000_s3339" name="Equation" r:id="rId17" imgW="254000" imgH="241300" progId="Equation.3">
                   <p:embed/>
                 </p:oleObj>
               </mc:Choice>
@@ -6442,7 +6445,7 @@
           <p:nvPr>
             <p:extLst>
               <p:ext uri="{D42A27DB-BD31-4B8C-83A1-F6EECF244321}">
-                <p14:modId xmlns:p14="http://schemas.microsoft.com/office/powerpoint/2010/main" val="3704519302"/>
+                <p14:modId xmlns:p14="http://schemas.microsoft.com/office/powerpoint/2010/main" val="2983579819"/>
               </p:ext>
             </p:extLst>
           </p:nvPr>
@@ -6455,7 +6458,7 @@
           <a:graphicData uri="http://schemas.openxmlformats.org/presentationml/2006/ole">
             <mc:AlternateContent xmlns:mc="http://schemas.openxmlformats.org/markup-compatibility/2006">
               <mc:Choice xmlns:v="urn:schemas-microsoft-com:vml" Requires="v">
-                <p:oleObj spid="_x0000_s3239" name="Equation" r:id="rId19" imgW="254000" imgH="241300" progId="Equation.3">
+                <p:oleObj spid="_x0000_s3340" name="Equation" r:id="rId19" imgW="254000" imgH="241300" progId="Equation.3">
                   <p:embed/>
                 </p:oleObj>
               </mc:Choice>
@@ -6546,7 +6549,7 @@
           <p:nvPr>
             <p:extLst>
               <p:ext uri="{D42A27DB-BD31-4B8C-83A1-F6EECF244321}">
-                <p14:modId xmlns:p14="http://schemas.microsoft.com/office/powerpoint/2010/main" val="1702305316"/>
+                <p14:modId xmlns:p14="http://schemas.microsoft.com/office/powerpoint/2010/main" val="3228470474"/>
               </p:ext>
             </p:extLst>
           </p:nvPr>
@@ -6559,7 +6562,7 @@
           <a:graphicData uri="http://schemas.openxmlformats.org/presentationml/2006/ole">
             <mc:AlternateContent xmlns:mc="http://schemas.openxmlformats.org/markup-compatibility/2006">
               <mc:Choice xmlns:v="urn:schemas-microsoft-com:vml" Requires="v">
-                <p:oleObj spid="_x0000_s3240" name="Equation" r:id="rId21" imgW="279400" imgH="241300" progId="Equation.3">
+                <p:oleObj spid="_x0000_s3341" name="Equation" r:id="rId21" imgW="279400" imgH="241300" progId="Equation.3">
                   <p:embed/>
                 </p:oleObj>
               </mc:Choice>
@@ -6695,7 +6698,7 @@
           <p:nvPr>
             <p:extLst>
               <p:ext uri="{D42A27DB-BD31-4B8C-83A1-F6EECF244321}">
-                <p14:modId xmlns:p14="http://schemas.microsoft.com/office/powerpoint/2010/main" val="1050276416"/>
+                <p14:modId xmlns:p14="http://schemas.microsoft.com/office/powerpoint/2010/main" val="3568082823"/>
               </p:ext>
             </p:extLst>
           </p:nvPr>
@@ -6708,7 +6711,7 @@
           <a:graphicData uri="http://schemas.openxmlformats.org/presentationml/2006/ole">
             <mc:AlternateContent xmlns:mc="http://schemas.openxmlformats.org/markup-compatibility/2006">
               <mc:Choice xmlns:v="urn:schemas-microsoft-com:vml" Requires="v">
-                <p:oleObj spid="_x0000_s3241" name="Equation" r:id="rId23" imgW="279400" imgH="241300" progId="Equation.3">
+                <p:oleObj spid="_x0000_s3342" name="Equation" r:id="rId23" imgW="279400" imgH="241300" progId="Equation.3">
                   <p:embed/>
                 </p:oleObj>
               </mc:Choice>
@@ -6799,7 +6802,7 @@
           <p:nvPr>
             <p:extLst>
               <p:ext uri="{D42A27DB-BD31-4B8C-83A1-F6EECF244321}">
-                <p14:modId xmlns:p14="http://schemas.microsoft.com/office/powerpoint/2010/main" val="3302099846"/>
+                <p14:modId xmlns:p14="http://schemas.microsoft.com/office/powerpoint/2010/main" val="856506253"/>
               </p:ext>
             </p:extLst>
           </p:nvPr>
@@ -6812,7 +6815,7 @@
           <a:graphicData uri="http://schemas.openxmlformats.org/presentationml/2006/ole">
             <mc:AlternateContent xmlns:mc="http://schemas.openxmlformats.org/markup-compatibility/2006">
               <mc:Choice xmlns:v="urn:schemas-microsoft-com:vml" Requires="v">
-                <p:oleObj spid="_x0000_s3242" name="Equation" r:id="rId25" imgW="279400" imgH="241300" progId="Equation.3">
+                <p:oleObj spid="_x0000_s3343" name="Equation" r:id="rId25" imgW="279400" imgH="241300" progId="Equation.3">
                   <p:embed/>
                 </p:oleObj>
               </mc:Choice>
@@ -6903,7 +6906,7 @@
           <p:nvPr>
             <p:extLst>
               <p:ext uri="{D42A27DB-BD31-4B8C-83A1-F6EECF244321}">
-                <p14:modId xmlns:p14="http://schemas.microsoft.com/office/powerpoint/2010/main" val="2773532763"/>
+                <p14:modId xmlns:p14="http://schemas.microsoft.com/office/powerpoint/2010/main" val="3382358815"/>
               </p:ext>
             </p:extLst>
           </p:nvPr>
@@ -6916,7 +6919,7 @@
           <a:graphicData uri="http://schemas.openxmlformats.org/presentationml/2006/ole">
             <mc:AlternateContent xmlns:mc="http://schemas.openxmlformats.org/markup-compatibility/2006">
               <mc:Choice xmlns:v="urn:schemas-microsoft-com:vml" Requires="v">
-                <p:oleObj spid="_x0000_s3243" name="Equation" r:id="rId27" imgW="279400" imgH="241300" progId="Equation.3">
+                <p:oleObj spid="_x0000_s3344" name="Equation" r:id="rId27" imgW="279400" imgH="241300" progId="Equation.3">
                   <p:embed/>
                 </p:oleObj>
               </mc:Choice>
@@ -7007,7 +7010,7 @@
           <p:nvPr>
             <p:extLst>
               <p:ext uri="{D42A27DB-BD31-4B8C-83A1-F6EECF244321}">
-                <p14:modId xmlns:p14="http://schemas.microsoft.com/office/powerpoint/2010/main" val="1777025314"/>
+                <p14:modId xmlns:p14="http://schemas.microsoft.com/office/powerpoint/2010/main" val="1116192699"/>
               </p:ext>
             </p:extLst>
           </p:nvPr>
@@ -7020,7 +7023,7 @@
           <a:graphicData uri="http://schemas.openxmlformats.org/presentationml/2006/ole">
             <mc:AlternateContent xmlns:mc="http://schemas.openxmlformats.org/markup-compatibility/2006">
               <mc:Choice xmlns:v="urn:schemas-microsoft-com:vml" Requires="v">
-                <p:oleObj spid="_x0000_s3244" name="Equation" r:id="rId29" imgW="279400" imgH="241300" progId="Equation.3">
+                <p:oleObj spid="_x0000_s3345" name="Equation" r:id="rId29" imgW="279400" imgH="241300" progId="Equation.3">
                   <p:embed/>
                 </p:oleObj>
               </mc:Choice>
@@ -7111,7 +7114,7 @@
           <p:nvPr>
             <p:extLst>
               <p:ext uri="{D42A27DB-BD31-4B8C-83A1-F6EECF244321}">
-                <p14:modId xmlns:p14="http://schemas.microsoft.com/office/powerpoint/2010/main" val="592452861"/>
+                <p14:modId xmlns:p14="http://schemas.microsoft.com/office/powerpoint/2010/main" val="1800941061"/>
               </p:ext>
             </p:extLst>
           </p:nvPr>
@@ -7124,7 +7127,7 @@
           <a:graphicData uri="http://schemas.openxmlformats.org/presentationml/2006/ole">
             <mc:AlternateContent xmlns:mc="http://schemas.openxmlformats.org/markup-compatibility/2006">
               <mc:Choice xmlns:v="urn:schemas-microsoft-com:vml" Requires="v">
-                <p:oleObj spid="_x0000_s3245" name="Equation" r:id="rId31" imgW="279400" imgH="241300" progId="Equation.3">
+                <p:oleObj spid="_x0000_s3346" name="Equation" r:id="rId31" imgW="279400" imgH="241300" progId="Equation.3">
                   <p:embed/>
                 </p:oleObj>
               </mc:Choice>
@@ -7260,7 +7263,7 @@
           <p:nvPr>
             <p:extLst>
               <p:ext uri="{D42A27DB-BD31-4B8C-83A1-F6EECF244321}">
-                <p14:modId xmlns:p14="http://schemas.microsoft.com/office/powerpoint/2010/main" val="2916539197"/>
+                <p14:modId xmlns:p14="http://schemas.microsoft.com/office/powerpoint/2010/main" val="1476380801"/>
               </p:ext>
             </p:extLst>
           </p:nvPr>
@@ -7273,7 +7276,7 @@
           <a:graphicData uri="http://schemas.openxmlformats.org/presentationml/2006/ole">
             <mc:AlternateContent xmlns:mc="http://schemas.openxmlformats.org/markup-compatibility/2006">
               <mc:Choice xmlns:v="urn:schemas-microsoft-com:vml" Requires="v">
-                <p:oleObj spid="_x0000_s3246" name="Equation" r:id="rId33" imgW="279400" imgH="241300" progId="Equation.3">
+                <p:oleObj spid="_x0000_s3347" name="Equation" r:id="rId33" imgW="279400" imgH="241300" progId="Equation.3">
                   <p:embed/>
                 </p:oleObj>
               </mc:Choice>
@@ -7319,7 +7322,7 @@
           <p:nvPr>
             <p:extLst>
               <p:ext uri="{D42A27DB-BD31-4B8C-83A1-F6EECF244321}">
-                <p14:modId xmlns:p14="http://schemas.microsoft.com/office/powerpoint/2010/main" val="4004762233"/>
+                <p14:modId xmlns:p14="http://schemas.microsoft.com/office/powerpoint/2010/main" val="215103933"/>
               </p:ext>
             </p:extLst>
           </p:nvPr>
@@ -7332,7 +7335,7 @@
           <a:graphicData uri="http://schemas.openxmlformats.org/presentationml/2006/ole">
             <mc:AlternateContent xmlns:mc="http://schemas.openxmlformats.org/markup-compatibility/2006">
               <mc:Choice xmlns:v="urn:schemas-microsoft-com:vml" Requires="v">
-                <p:oleObj spid="_x0000_s3247" name="Equation" r:id="rId35" imgW="279400" imgH="241300" progId="Equation.3">
+                <p:oleObj spid="_x0000_s3348" name="Equation" r:id="rId35" imgW="279400" imgH="241300" progId="Equation.3">
                   <p:embed/>
                 </p:oleObj>
               </mc:Choice>
@@ -7378,7 +7381,7 @@
           <p:nvPr>
             <p:extLst>
               <p:ext uri="{D42A27DB-BD31-4B8C-83A1-F6EECF244321}">
-                <p14:modId xmlns:p14="http://schemas.microsoft.com/office/powerpoint/2010/main" val="3870925489"/>
+                <p14:modId xmlns:p14="http://schemas.microsoft.com/office/powerpoint/2010/main" val="1254796206"/>
               </p:ext>
             </p:extLst>
           </p:nvPr>
@@ -7391,7 +7394,7 @@
           <a:graphicData uri="http://schemas.openxmlformats.org/presentationml/2006/ole">
             <mc:AlternateContent xmlns:mc="http://schemas.openxmlformats.org/markup-compatibility/2006">
               <mc:Choice xmlns:v="urn:schemas-microsoft-com:vml" Requires="v">
-                <p:oleObj spid="_x0000_s3248" name="Equation" r:id="rId37" imgW="279400" imgH="241300" progId="Equation.3">
+                <p:oleObj spid="_x0000_s3349" name="Equation" r:id="rId37" imgW="279400" imgH="241300" progId="Equation.3">
                   <p:embed/>
                 </p:oleObj>
               </mc:Choice>
@@ -7482,7 +7485,7 @@
           <p:nvPr>
             <p:extLst>
               <p:ext uri="{D42A27DB-BD31-4B8C-83A1-F6EECF244321}">
-                <p14:modId xmlns:p14="http://schemas.microsoft.com/office/powerpoint/2010/main" val="3791746600"/>
+                <p14:modId xmlns:p14="http://schemas.microsoft.com/office/powerpoint/2010/main" val="769566461"/>
               </p:ext>
             </p:extLst>
           </p:nvPr>
@@ -7495,7 +7498,7 @@
           <a:graphicData uri="http://schemas.openxmlformats.org/presentationml/2006/ole">
             <mc:AlternateContent xmlns:mc="http://schemas.openxmlformats.org/markup-compatibility/2006">
               <mc:Choice xmlns:v="urn:schemas-microsoft-com:vml" Requires="v">
-                <p:oleObj spid="_x0000_s3249" name="Equation" r:id="rId39" imgW="139700" imgH="228600" progId="Equation.3">
+                <p:oleObj spid="_x0000_s3350" name="Equation" r:id="rId39" imgW="139700" imgH="228600" progId="Equation.3">
                   <p:embed/>
                 </p:oleObj>
               </mc:Choice>
@@ -7631,7 +7634,7 @@
           <p:nvPr>
             <p:extLst>
               <p:ext uri="{D42A27DB-BD31-4B8C-83A1-F6EECF244321}">
-                <p14:modId xmlns:p14="http://schemas.microsoft.com/office/powerpoint/2010/main" val="2537538833"/>
+                <p14:modId xmlns:p14="http://schemas.microsoft.com/office/powerpoint/2010/main" val="3490196374"/>
               </p:ext>
             </p:extLst>
           </p:nvPr>
@@ -7644,7 +7647,7 @@
           <a:graphicData uri="http://schemas.openxmlformats.org/presentationml/2006/ole">
             <mc:AlternateContent xmlns:mc="http://schemas.openxmlformats.org/markup-compatibility/2006">
               <mc:Choice xmlns:v="urn:schemas-microsoft-com:vml" Requires="v">
-                <p:oleObj spid="_x0000_s3250" name="Equation" r:id="rId41" imgW="139700" imgH="228600" progId="Equation.3">
+                <p:oleObj spid="_x0000_s3351" name="Equation" r:id="rId41" imgW="139700" imgH="228600" progId="Equation.3">
                   <p:embed/>
                 </p:oleObj>
               </mc:Choice>
@@ -7690,7 +7693,7 @@
           <p:nvPr>
             <p:extLst>
               <p:ext uri="{D42A27DB-BD31-4B8C-83A1-F6EECF244321}">
-                <p14:modId xmlns:p14="http://schemas.microsoft.com/office/powerpoint/2010/main" val="986561443"/>
+                <p14:modId xmlns:p14="http://schemas.microsoft.com/office/powerpoint/2010/main" val="3873330405"/>
               </p:ext>
             </p:extLst>
           </p:nvPr>
@@ -7703,7 +7706,7 @@
           <a:graphicData uri="http://schemas.openxmlformats.org/presentationml/2006/ole">
             <mc:AlternateContent xmlns:mc="http://schemas.openxmlformats.org/markup-compatibility/2006">
               <mc:Choice xmlns:v="urn:schemas-microsoft-com:vml" Requires="v">
-                <p:oleObj spid="_x0000_s3251" name="Equation" r:id="rId43" imgW="139700" imgH="241300" progId="Equation.3">
+                <p:oleObj spid="_x0000_s3352" name="Equation" r:id="rId43" imgW="139700" imgH="241300" progId="Equation.3">
                   <p:embed/>
                 </p:oleObj>
               </mc:Choice>
@@ -7794,7 +7797,7 @@
           <p:nvPr>
             <p:extLst>
               <p:ext uri="{D42A27DB-BD31-4B8C-83A1-F6EECF244321}">
-                <p14:modId xmlns:p14="http://schemas.microsoft.com/office/powerpoint/2010/main" val="3332703899"/>
+                <p14:modId xmlns:p14="http://schemas.microsoft.com/office/powerpoint/2010/main" val="3009515068"/>
               </p:ext>
             </p:extLst>
           </p:nvPr>
@@ -7807,7 +7810,7 @@
           <a:graphicData uri="http://schemas.openxmlformats.org/presentationml/2006/ole">
             <mc:AlternateContent xmlns:mc="http://schemas.openxmlformats.org/markup-compatibility/2006">
               <mc:Choice xmlns:v="urn:schemas-microsoft-com:vml" Requires="v">
-                <p:oleObj spid="_x0000_s3252" name="Equation" r:id="rId45" imgW="165100" imgH="228600" progId="Equation.3">
+                <p:oleObj spid="_x0000_s3353" name="Equation" r:id="rId45" imgW="165100" imgH="228600" progId="Equation.3">
                   <p:embed/>
                 </p:oleObj>
               </mc:Choice>
@@ -7943,7 +7946,7 @@
           <p:nvPr>
             <p:extLst>
               <p:ext uri="{D42A27DB-BD31-4B8C-83A1-F6EECF244321}">
-                <p14:modId xmlns:p14="http://schemas.microsoft.com/office/powerpoint/2010/main" val="2495347231"/>
+                <p14:modId xmlns:p14="http://schemas.microsoft.com/office/powerpoint/2010/main" val="774746000"/>
               </p:ext>
             </p:extLst>
           </p:nvPr>
@@ -7956,7 +7959,7 @@
           <a:graphicData uri="http://schemas.openxmlformats.org/presentationml/2006/ole">
             <mc:AlternateContent xmlns:mc="http://schemas.openxmlformats.org/markup-compatibility/2006">
               <mc:Choice xmlns:v="urn:schemas-microsoft-com:vml" Requires="v">
-                <p:oleObj spid="_x0000_s3253" name="Equation" r:id="rId47" imgW="165100" imgH="228600" progId="Equation.3">
+                <p:oleObj spid="_x0000_s3354" name="Equation" r:id="rId47" imgW="165100" imgH="228600" progId="Equation.3">
                   <p:embed/>
                 </p:oleObj>
               </mc:Choice>
@@ -8002,7 +8005,7 @@
           <p:nvPr>
             <p:extLst>
               <p:ext uri="{D42A27DB-BD31-4B8C-83A1-F6EECF244321}">
-                <p14:modId xmlns:p14="http://schemas.microsoft.com/office/powerpoint/2010/main" val="591113123"/>
+                <p14:modId xmlns:p14="http://schemas.microsoft.com/office/powerpoint/2010/main" val="3063205486"/>
               </p:ext>
             </p:extLst>
           </p:nvPr>
@@ -8015,7 +8018,7 @@
           <a:graphicData uri="http://schemas.openxmlformats.org/presentationml/2006/ole">
             <mc:AlternateContent xmlns:mc="http://schemas.openxmlformats.org/markup-compatibility/2006">
               <mc:Choice xmlns:v="urn:schemas-microsoft-com:vml" Requires="v">
-                <p:oleObj spid="_x0000_s3254" name="Equation" r:id="rId49" imgW="165100" imgH="241300" progId="Equation.3">
+                <p:oleObj spid="_x0000_s3355" name="Equation" r:id="rId49" imgW="165100" imgH="241300" progId="Equation.3">
                   <p:embed/>
                 </p:oleObj>
               </mc:Choice>
@@ -8040,242 +8043,6 @@
                       <a:xfrm>
                         <a:off x="6914357" y="-3363094"/>
                         <a:ext cx="330200" cy="482600"/>
-                      </a:xfrm>
-                      <a:prstGeom prst="rect">
-                        <a:avLst/>
-                      </a:prstGeom>
-                    </p:spPr>
-                  </p:pic>
-                </p:oleObj>
-              </mc:Fallback>
-            </mc:AlternateContent>
-          </a:graphicData>
-        </a:graphic>
-      </p:graphicFrame>
-      <p:graphicFrame>
-        <p:nvGraphicFramePr>
-          <p:cNvPr id="160" name="Object 159"/>
-          <p:cNvGraphicFramePr>
-            <a:graphicFrameLocks noChangeAspect="1"/>
-          </p:cNvGraphicFramePr>
-          <p:nvPr>
-            <p:extLst>
-              <p:ext uri="{D42A27DB-BD31-4B8C-83A1-F6EECF244321}">
-                <p14:modId xmlns:p14="http://schemas.microsoft.com/office/powerpoint/2010/main" val="1114899655"/>
-              </p:ext>
-            </p:extLst>
-          </p:nvPr>
-        </p:nvGraphicFramePr>
-        <p:xfrm>
-          <a:off x="1384789" y="-4939905"/>
-          <a:ext cx="6781800" cy="1447800"/>
-        </p:xfrm>
-        <a:graphic>
-          <a:graphicData uri="http://schemas.openxmlformats.org/presentationml/2006/ole">
-            <mc:AlternateContent xmlns:mc="http://schemas.openxmlformats.org/markup-compatibility/2006">
-              <mc:Choice xmlns:v="urn:schemas-microsoft-com:vml" Requires="v">
-                <p:oleObj spid="_x0000_s3255" name="Equation" r:id="rId51" imgW="3390900" imgH="723900" progId="Equation.3">
-                  <p:embed/>
-                </p:oleObj>
-              </mc:Choice>
-              <mc:Fallback>
-                <p:oleObj name="Equation" r:id="rId51" imgW="3390900" imgH="723900" progId="Equation.3">
-                  <p:embed/>
-                  <p:pic>
-                    <p:nvPicPr>
-                      <p:cNvPr id="0" name=""/>
-                      <p:cNvPicPr/>
-                      <p:nvPr/>
-                    </p:nvPicPr>
-                    <p:blipFill>
-                      <a:blip r:embed="rId52">
-                        <a:alphaModFix/>
-                      </a:blip>
-                      <a:stretch>
-                        <a:fillRect/>
-                      </a:stretch>
-                    </p:blipFill>
-                    <p:spPr>
-                      <a:xfrm>
-                        <a:off x="1384789" y="-4939905"/>
-                        <a:ext cx="6781800" cy="1447800"/>
-                      </a:xfrm>
-                      <a:prstGeom prst="rect">
-                        <a:avLst/>
-                      </a:prstGeom>
-                    </p:spPr>
-                  </p:pic>
-                </p:oleObj>
-              </mc:Fallback>
-            </mc:AlternateContent>
-          </a:graphicData>
-        </a:graphic>
-      </p:graphicFrame>
-      <p:graphicFrame>
-        <p:nvGraphicFramePr>
-          <p:cNvPr id="161" name="Object 160"/>
-          <p:cNvGraphicFramePr>
-            <a:graphicFrameLocks noChangeAspect="1"/>
-          </p:cNvGraphicFramePr>
-          <p:nvPr>
-            <p:extLst>
-              <p:ext uri="{D42A27DB-BD31-4B8C-83A1-F6EECF244321}">
-                <p14:modId xmlns:p14="http://schemas.microsoft.com/office/powerpoint/2010/main" val="2087126142"/>
-              </p:ext>
-            </p:extLst>
-          </p:nvPr>
-        </p:nvGraphicFramePr>
-        <p:xfrm>
-          <a:off x="2295431" y="5197475"/>
-          <a:ext cx="558800" cy="482600"/>
-        </p:xfrm>
-        <a:graphic>
-          <a:graphicData uri="http://schemas.openxmlformats.org/presentationml/2006/ole">
-            <mc:AlternateContent xmlns:mc="http://schemas.openxmlformats.org/markup-compatibility/2006">
-              <mc:Choice xmlns:v="urn:schemas-microsoft-com:vml" Requires="v">
-                <p:oleObj spid="_x0000_s3256" name="Equation" r:id="rId53" imgW="279400" imgH="241300" progId="Equation.3">
-                  <p:embed/>
-                </p:oleObj>
-              </mc:Choice>
-              <mc:Fallback>
-                <p:oleObj name="Equation" r:id="rId53" imgW="279400" imgH="241300" progId="Equation.3">
-                  <p:embed/>
-                  <p:pic>
-                    <p:nvPicPr>
-                      <p:cNvPr id="0" name=""/>
-                      <p:cNvPicPr/>
-                      <p:nvPr/>
-                    </p:nvPicPr>
-                    <p:blipFill>
-                      <a:blip r:embed="rId54">
-                        <a:alphaModFix/>
-                      </a:blip>
-                      <a:stretch>
-                        <a:fillRect/>
-                      </a:stretch>
-                    </p:blipFill>
-                    <p:spPr>
-                      <a:xfrm>
-                        <a:off x="2295431" y="5197475"/>
-                        <a:ext cx="558800" cy="482600"/>
-                      </a:xfrm>
-                      <a:prstGeom prst="rect">
-                        <a:avLst/>
-                      </a:prstGeom>
-                    </p:spPr>
-                  </p:pic>
-                </p:oleObj>
-              </mc:Fallback>
-            </mc:AlternateContent>
-          </a:graphicData>
-        </a:graphic>
-      </p:graphicFrame>
-      <p:graphicFrame>
-        <p:nvGraphicFramePr>
-          <p:cNvPr id="162" name="Object 161"/>
-          <p:cNvGraphicFramePr>
-            <a:graphicFrameLocks noChangeAspect="1"/>
-          </p:cNvGraphicFramePr>
-          <p:nvPr>
-            <p:extLst>
-              <p:ext uri="{D42A27DB-BD31-4B8C-83A1-F6EECF244321}">
-                <p14:modId xmlns:p14="http://schemas.microsoft.com/office/powerpoint/2010/main" val="128766027"/>
-              </p:ext>
-            </p:extLst>
-          </p:nvPr>
-        </p:nvGraphicFramePr>
-        <p:xfrm>
-          <a:off x="4701652" y="5197475"/>
-          <a:ext cx="558800" cy="482600"/>
-        </p:xfrm>
-        <a:graphic>
-          <a:graphicData uri="http://schemas.openxmlformats.org/presentationml/2006/ole">
-            <mc:AlternateContent xmlns:mc="http://schemas.openxmlformats.org/markup-compatibility/2006">
-              <mc:Choice xmlns:v="urn:schemas-microsoft-com:vml" Requires="v">
-                <p:oleObj spid="_x0000_s3257" name="Equation" r:id="rId55" imgW="279400" imgH="241300" progId="Equation.3">
-                  <p:embed/>
-                </p:oleObj>
-              </mc:Choice>
-              <mc:Fallback>
-                <p:oleObj name="Equation" r:id="rId55" imgW="279400" imgH="241300" progId="Equation.3">
-                  <p:embed/>
-                  <p:pic>
-                    <p:nvPicPr>
-                      <p:cNvPr id="0" name=""/>
-                      <p:cNvPicPr/>
-                      <p:nvPr/>
-                    </p:nvPicPr>
-                    <p:blipFill>
-                      <a:blip r:embed="rId56">
-                        <a:alphaModFix/>
-                      </a:blip>
-                      <a:stretch>
-                        <a:fillRect/>
-                      </a:stretch>
-                    </p:blipFill>
-                    <p:spPr>
-                      <a:xfrm>
-                        <a:off x="4701652" y="5197475"/>
-                        <a:ext cx="558800" cy="482600"/>
-                      </a:xfrm>
-                      <a:prstGeom prst="rect">
-                        <a:avLst/>
-                      </a:prstGeom>
-                    </p:spPr>
-                  </p:pic>
-                </p:oleObj>
-              </mc:Fallback>
-            </mc:AlternateContent>
-          </a:graphicData>
-        </a:graphic>
-      </p:graphicFrame>
-      <p:graphicFrame>
-        <p:nvGraphicFramePr>
-          <p:cNvPr id="163" name="Object 162"/>
-          <p:cNvGraphicFramePr>
-            <a:graphicFrameLocks noChangeAspect="1"/>
-          </p:cNvGraphicFramePr>
-          <p:nvPr>
-            <p:extLst>
-              <p:ext uri="{D42A27DB-BD31-4B8C-83A1-F6EECF244321}">
-                <p14:modId xmlns:p14="http://schemas.microsoft.com/office/powerpoint/2010/main" val="1114390026"/>
-              </p:ext>
-            </p:extLst>
-          </p:nvPr>
-        </p:nvGraphicFramePr>
-        <p:xfrm>
-          <a:off x="7097849" y="5197475"/>
-          <a:ext cx="558800" cy="482600"/>
-        </p:xfrm>
-        <a:graphic>
-          <a:graphicData uri="http://schemas.openxmlformats.org/presentationml/2006/ole">
-            <mc:AlternateContent xmlns:mc="http://schemas.openxmlformats.org/markup-compatibility/2006">
-              <mc:Choice xmlns:v="urn:schemas-microsoft-com:vml" Requires="v">
-                <p:oleObj spid="_x0000_s3258" name="Equation" r:id="rId57" imgW="279400" imgH="241300" progId="Equation.3">
-                  <p:embed/>
-                </p:oleObj>
-              </mc:Choice>
-              <mc:Fallback>
-                <p:oleObj name="Equation" r:id="rId57" imgW="279400" imgH="241300" progId="Equation.3">
-                  <p:embed/>
-                  <p:pic>
-                    <p:nvPicPr>
-                      <p:cNvPr id="0" name=""/>
-                      <p:cNvPicPr/>
-                      <p:nvPr/>
-                    </p:nvPicPr>
-                    <p:blipFill>
-                      <a:blip r:embed="rId58">
-                        <a:alphaModFix/>
-                      </a:blip>
-                      <a:stretch>
-                        <a:fillRect/>
-                      </a:stretch>
-                    </p:blipFill>
-                    <p:spPr>
-                      <a:xfrm>
-                        <a:off x="7097849" y="5197475"/>
-                        <a:ext cx="558800" cy="482600"/>
                       </a:xfrm>
                       <a:prstGeom prst="rect">
                         <a:avLst/>
@@ -8506,7 +8273,7 @@
           <p:nvPr>
             <p:extLst>
               <p:ext uri="{D42A27DB-BD31-4B8C-83A1-F6EECF244321}">
-                <p14:modId xmlns:p14="http://schemas.microsoft.com/office/powerpoint/2010/main" val="1698816724"/>
+                <p14:modId xmlns:p14="http://schemas.microsoft.com/office/powerpoint/2010/main" val="4245418732"/>
               </p:ext>
             </p:extLst>
           </p:nvPr>
@@ -8519,7 +8286,7 @@
           <a:graphicData uri="http://schemas.openxmlformats.org/presentationml/2006/ole">
             <mc:AlternateContent xmlns:mc="http://schemas.openxmlformats.org/markup-compatibility/2006">
               <mc:Choice xmlns:v="urn:schemas-microsoft-com:vml" Requires="v">
-                <p:oleObj spid="_x0000_s4130" name="Equation" r:id="rId3" imgW="127000" imgH="165100" progId="Equation.3">
+                <p:oleObj spid="_x0000_s4168" name="Equation" r:id="rId3" imgW="127000" imgH="165100" progId="Equation.3">
                   <p:embed/>
                 </p:oleObj>
               </mc:Choice>
@@ -8563,7 +8330,7 @@
           <p:nvPr>
             <p:extLst>
               <p:ext uri="{D42A27DB-BD31-4B8C-83A1-F6EECF244321}">
-                <p14:modId xmlns:p14="http://schemas.microsoft.com/office/powerpoint/2010/main" val="368417985"/>
+                <p14:modId xmlns:p14="http://schemas.microsoft.com/office/powerpoint/2010/main" val="1110208997"/>
               </p:ext>
             </p:extLst>
           </p:nvPr>
@@ -8576,7 +8343,7 @@
           <a:graphicData uri="http://schemas.openxmlformats.org/presentationml/2006/ole">
             <mc:AlternateContent xmlns:mc="http://schemas.openxmlformats.org/markup-compatibility/2006">
               <mc:Choice xmlns:v="urn:schemas-microsoft-com:vml" Requires="v">
-                <p:oleObj spid="_x0000_s4131" name="Equation" r:id="rId5" imgW="152400" imgH="203200" progId="Equation.3">
+                <p:oleObj spid="_x0000_s4169" name="Equation" r:id="rId5" imgW="152400" imgH="203200" progId="Equation.3">
                   <p:embed/>
                 </p:oleObj>
               </mc:Choice>
@@ -8620,7 +8387,7 @@
           <p:nvPr>
             <p:extLst>
               <p:ext uri="{D42A27DB-BD31-4B8C-83A1-F6EECF244321}">
-                <p14:modId xmlns:p14="http://schemas.microsoft.com/office/powerpoint/2010/main" val="153211463"/>
+                <p14:modId xmlns:p14="http://schemas.microsoft.com/office/powerpoint/2010/main" val="1087347017"/>
               </p:ext>
             </p:extLst>
           </p:nvPr>
@@ -8633,7 +8400,7 @@
           <a:graphicData uri="http://schemas.openxmlformats.org/presentationml/2006/ole">
             <mc:AlternateContent xmlns:mc="http://schemas.openxmlformats.org/markup-compatibility/2006">
               <mc:Choice xmlns:v="urn:schemas-microsoft-com:vml" Requires="v">
-                <p:oleObj spid="_x0000_s4132" name="Equation" r:id="rId7" imgW="177800" imgH="203200" progId="Equation.3">
+                <p:oleObj spid="_x0000_s4170" name="Equation" r:id="rId7" imgW="177800" imgH="203200" progId="Equation.3">
                   <p:embed/>
                 </p:oleObj>
               </mc:Choice>
@@ -8677,7 +8444,7 @@
           <p:nvPr>
             <p:extLst>
               <p:ext uri="{D42A27DB-BD31-4B8C-83A1-F6EECF244321}">
-                <p14:modId xmlns:p14="http://schemas.microsoft.com/office/powerpoint/2010/main" val="2356334770"/>
+                <p14:modId xmlns:p14="http://schemas.microsoft.com/office/powerpoint/2010/main" val="3773116937"/>
               </p:ext>
             </p:extLst>
           </p:nvPr>
@@ -8690,7 +8457,7 @@
           <a:graphicData uri="http://schemas.openxmlformats.org/presentationml/2006/ole">
             <mc:AlternateContent xmlns:mc="http://schemas.openxmlformats.org/markup-compatibility/2006">
               <mc:Choice xmlns:v="urn:schemas-microsoft-com:vml" Requires="v">
-                <p:oleObj spid="_x0000_s4133" name="Equation" r:id="rId9" imgW="165100" imgH="215900" progId="Equation.3">
+                <p:oleObj spid="_x0000_s4171" name="Equation" r:id="rId9" imgW="165100" imgH="215900" progId="Equation.3">
                   <p:embed/>
                 </p:oleObj>
               </mc:Choice>
@@ -8734,7 +8501,7 @@
           <p:nvPr>
             <p:extLst>
               <p:ext uri="{D42A27DB-BD31-4B8C-83A1-F6EECF244321}">
-                <p14:modId xmlns:p14="http://schemas.microsoft.com/office/powerpoint/2010/main" val="887341021"/>
+                <p14:modId xmlns:p14="http://schemas.microsoft.com/office/powerpoint/2010/main" val="1039662285"/>
               </p:ext>
             </p:extLst>
           </p:nvPr>
@@ -8747,7 +8514,7 @@
           <a:graphicData uri="http://schemas.openxmlformats.org/presentationml/2006/ole">
             <mc:AlternateContent xmlns:mc="http://schemas.openxmlformats.org/markup-compatibility/2006">
               <mc:Choice xmlns:v="urn:schemas-microsoft-com:vml" Requires="v">
-                <p:oleObj spid="_x0000_s4134" name="Equation" r:id="rId11" imgW="508000" imgH="203200" progId="Equation.3">
+                <p:oleObj spid="_x0000_s4172" name="Equation" r:id="rId11" imgW="508000" imgH="203200" progId="Equation.3">
                   <p:embed/>
                 </p:oleObj>
               </mc:Choice>
@@ -8791,7 +8558,7 @@
           <p:nvPr>
             <p:extLst>
               <p:ext uri="{D42A27DB-BD31-4B8C-83A1-F6EECF244321}">
-                <p14:modId xmlns:p14="http://schemas.microsoft.com/office/powerpoint/2010/main" val="224494767"/>
+                <p14:modId xmlns:p14="http://schemas.microsoft.com/office/powerpoint/2010/main" val="2645761939"/>
               </p:ext>
             </p:extLst>
           </p:nvPr>
@@ -8804,7 +8571,7 @@
           <a:graphicData uri="http://schemas.openxmlformats.org/presentationml/2006/ole">
             <mc:AlternateContent xmlns:mc="http://schemas.openxmlformats.org/markup-compatibility/2006">
               <mc:Choice xmlns:v="urn:schemas-microsoft-com:vml" Requires="v">
-                <p:oleObj spid="_x0000_s4135" name="Equation" r:id="rId13" imgW="317500" imgH="177800" progId="Equation.3">
+                <p:oleObj spid="_x0000_s4173" name="Equation" r:id="rId13" imgW="317500" imgH="177800" progId="Equation.3">
                   <p:embed/>
                 </p:oleObj>
               </mc:Choice>
@@ -8848,7 +8615,7 @@
           <p:nvPr>
             <p:extLst>
               <p:ext uri="{D42A27DB-BD31-4B8C-83A1-F6EECF244321}">
-                <p14:modId xmlns:p14="http://schemas.microsoft.com/office/powerpoint/2010/main" val="2112342190"/>
+                <p14:modId xmlns:p14="http://schemas.microsoft.com/office/powerpoint/2010/main" val="3443276851"/>
               </p:ext>
             </p:extLst>
           </p:nvPr>
@@ -8861,7 +8628,7 @@
           <a:graphicData uri="http://schemas.openxmlformats.org/presentationml/2006/ole">
             <mc:AlternateContent xmlns:mc="http://schemas.openxmlformats.org/markup-compatibility/2006">
               <mc:Choice xmlns:v="urn:schemas-microsoft-com:vml" Requires="v">
-                <p:oleObj spid="_x0000_s4136" name="Equation" r:id="rId15" imgW="330200" imgH="177800" progId="Equation.3">
+                <p:oleObj spid="_x0000_s4174" name="Equation" r:id="rId15" imgW="330200" imgH="177800" progId="Equation.3">
                   <p:embed/>
                 </p:oleObj>
               </mc:Choice>
@@ -8905,7 +8672,7 @@
           <p:nvPr>
             <p:extLst>
               <p:ext uri="{D42A27DB-BD31-4B8C-83A1-F6EECF244321}">
-                <p14:modId xmlns:p14="http://schemas.microsoft.com/office/powerpoint/2010/main" val="1952788993"/>
+                <p14:modId xmlns:p14="http://schemas.microsoft.com/office/powerpoint/2010/main" val="3281838943"/>
               </p:ext>
             </p:extLst>
           </p:nvPr>
@@ -8918,7 +8685,7 @@
           <a:graphicData uri="http://schemas.openxmlformats.org/presentationml/2006/ole">
             <mc:AlternateContent xmlns:mc="http://schemas.openxmlformats.org/markup-compatibility/2006">
               <mc:Choice xmlns:v="urn:schemas-microsoft-com:vml" Requires="v">
-                <p:oleObj spid="_x0000_s4137" name="Equation" r:id="rId17" imgW="177800" imgH="203200" progId="Equation.3">
+                <p:oleObj spid="_x0000_s4175" name="Equation" r:id="rId17" imgW="177800" imgH="203200" progId="Equation.3">
                   <p:embed/>
                 </p:oleObj>
               </mc:Choice>
@@ -8962,7 +8729,7 @@
           <p:nvPr>
             <p:extLst>
               <p:ext uri="{D42A27DB-BD31-4B8C-83A1-F6EECF244321}">
-                <p14:modId xmlns:p14="http://schemas.microsoft.com/office/powerpoint/2010/main" val="146654654"/>
+                <p14:modId xmlns:p14="http://schemas.microsoft.com/office/powerpoint/2010/main" val="3613667787"/>
               </p:ext>
             </p:extLst>
           </p:nvPr>
@@ -8975,7 +8742,7 @@
           <a:graphicData uri="http://schemas.openxmlformats.org/presentationml/2006/ole">
             <mc:AlternateContent xmlns:mc="http://schemas.openxmlformats.org/markup-compatibility/2006">
               <mc:Choice xmlns:v="urn:schemas-microsoft-com:vml" Requires="v">
-                <p:oleObj spid="_x0000_s4138" name="Equation" r:id="rId19" imgW="203200" imgH="203200" progId="Equation.3">
+                <p:oleObj spid="_x0000_s4176" name="Equation" r:id="rId19" imgW="203200" imgH="203200" progId="Equation.3">
                   <p:embed/>
                 </p:oleObj>
               </mc:Choice>
@@ -9019,7 +8786,7 @@
           <p:nvPr>
             <p:extLst>
               <p:ext uri="{D42A27DB-BD31-4B8C-83A1-F6EECF244321}">
-                <p14:modId xmlns:p14="http://schemas.microsoft.com/office/powerpoint/2010/main" val="1398746058"/>
+                <p14:modId xmlns:p14="http://schemas.microsoft.com/office/powerpoint/2010/main" val="2217290862"/>
               </p:ext>
             </p:extLst>
           </p:nvPr>
@@ -9032,7 +8799,7 @@
           <a:graphicData uri="http://schemas.openxmlformats.org/presentationml/2006/ole">
             <mc:AlternateContent xmlns:mc="http://schemas.openxmlformats.org/markup-compatibility/2006">
               <mc:Choice xmlns:v="urn:schemas-microsoft-com:vml" Requires="v">
-                <p:oleObj spid="_x0000_s4139" name="Equation" r:id="rId21" imgW="203200" imgH="203200" progId="Equation.3">
+                <p:oleObj spid="_x0000_s4177" name="Equation" r:id="rId21" imgW="203200" imgH="203200" progId="Equation.3">
                   <p:embed/>
                 </p:oleObj>
               </mc:Choice>
@@ -9069,32 +8836,32 @@
       </p:graphicFrame>
       <p:graphicFrame>
         <p:nvGraphicFramePr>
-          <p:cNvPr id="30" name="Object 29"/>
+          <p:cNvPr id="31" name="Object 30"/>
           <p:cNvGraphicFramePr>
             <a:graphicFrameLocks noChangeAspect="1"/>
           </p:cNvGraphicFramePr>
           <p:nvPr>
             <p:extLst>
               <p:ext uri="{D42A27DB-BD31-4B8C-83A1-F6EECF244321}">
-                <p14:modId xmlns:p14="http://schemas.microsoft.com/office/powerpoint/2010/main" val="314980657"/>
+                <p14:modId xmlns:p14="http://schemas.microsoft.com/office/powerpoint/2010/main" val="3235401460"/>
               </p:ext>
             </p:extLst>
           </p:nvPr>
         </p:nvGraphicFramePr>
         <p:xfrm>
-          <a:off x="1190625" y="4746625"/>
-          <a:ext cx="6853238" cy="1354138"/>
+          <a:off x="4607319" y="2446678"/>
+          <a:ext cx="3221426" cy="479455"/>
         </p:xfrm>
         <a:graphic>
           <a:graphicData uri="http://schemas.openxmlformats.org/presentationml/2006/ole">
             <mc:AlternateContent xmlns:mc="http://schemas.openxmlformats.org/markup-compatibility/2006">
               <mc:Choice xmlns:v="urn:schemas-microsoft-com:vml" Requires="v">
-                <p:oleObj spid="_x0000_s4140" name="Equation" r:id="rId23" imgW="5270500" imgH="1041400" progId="Equation.3">
+                <p:oleObj spid="_x0000_s4178" name="Equation" r:id="rId23" imgW="1625600" imgH="241300" progId="Equation.3">
                   <p:embed/>
                 </p:oleObj>
               </mc:Choice>
               <mc:Fallback>
-                <p:oleObj name="Equation" r:id="rId23" imgW="5270500" imgH="1041400" progId="Equation.3">
+                <p:oleObj name="Equation" r:id="rId23" imgW="1625600" imgH="241300" progId="Equation.3">
                   <p:embed/>
                   <p:pic>
                     <p:nvPicPr>
@@ -9104,63 +8871,6 @@
                     </p:nvPicPr>
                     <p:blipFill>
                       <a:blip r:embed="rId24"/>
-                      <a:stretch>
-                        <a:fillRect/>
-                      </a:stretch>
-                    </p:blipFill>
-                    <p:spPr>
-                      <a:xfrm>
-                        <a:off x="1190625" y="4746625"/>
-                        <a:ext cx="6853238" cy="1354138"/>
-                      </a:xfrm>
-                      <a:prstGeom prst="rect">
-                        <a:avLst/>
-                      </a:prstGeom>
-                    </p:spPr>
-                  </p:pic>
-                </p:oleObj>
-              </mc:Fallback>
-            </mc:AlternateContent>
-          </a:graphicData>
-        </a:graphic>
-      </p:graphicFrame>
-      <p:graphicFrame>
-        <p:nvGraphicFramePr>
-          <p:cNvPr id="31" name="Object 30"/>
-          <p:cNvGraphicFramePr>
-            <a:graphicFrameLocks noChangeAspect="1"/>
-          </p:cNvGraphicFramePr>
-          <p:nvPr>
-            <p:extLst>
-              <p:ext uri="{D42A27DB-BD31-4B8C-83A1-F6EECF244321}">
-                <p14:modId xmlns:p14="http://schemas.microsoft.com/office/powerpoint/2010/main" val="2082040210"/>
-              </p:ext>
-            </p:extLst>
-          </p:nvPr>
-        </p:nvGraphicFramePr>
-        <p:xfrm>
-          <a:off x="4607319" y="2446678"/>
-          <a:ext cx="3221426" cy="479455"/>
-        </p:xfrm>
-        <a:graphic>
-          <a:graphicData uri="http://schemas.openxmlformats.org/presentationml/2006/ole">
-            <mc:AlternateContent xmlns:mc="http://schemas.openxmlformats.org/markup-compatibility/2006">
-              <mc:Choice xmlns:v="urn:schemas-microsoft-com:vml" Requires="v">
-                <p:oleObj spid="_x0000_s4141" name="Equation" r:id="rId25" imgW="1625600" imgH="241300" progId="Equation.3">
-                  <p:embed/>
-                </p:oleObj>
-              </mc:Choice>
-              <mc:Fallback>
-                <p:oleObj name="Equation" r:id="rId25" imgW="1625600" imgH="241300" progId="Equation.3">
-                  <p:embed/>
-                  <p:pic>
-                    <p:nvPicPr>
-                      <p:cNvPr id="0" name=""/>
-                      <p:cNvPicPr/>
-                      <p:nvPr/>
-                    </p:nvPicPr>
-                    <p:blipFill>
-                      <a:blip r:embed="rId26"/>
                       <a:stretch>
                         <a:fillRect/>
                       </a:stretch>
@@ -9190,7 +8900,7 @@
           <p:nvPr>
             <p:extLst>
               <p:ext uri="{D42A27DB-BD31-4B8C-83A1-F6EECF244321}">
-                <p14:modId xmlns:p14="http://schemas.microsoft.com/office/powerpoint/2010/main" val="2456084529"/>
+                <p14:modId xmlns:p14="http://schemas.microsoft.com/office/powerpoint/2010/main" val="3596755870"/>
               </p:ext>
             </p:extLst>
           </p:nvPr>
@@ -9203,12 +8913,12 @@
           <a:graphicData uri="http://schemas.openxmlformats.org/presentationml/2006/ole">
             <mc:AlternateContent xmlns:mc="http://schemas.openxmlformats.org/markup-compatibility/2006">
               <mc:Choice xmlns:v="urn:schemas-microsoft-com:vml" Requires="v">
-                <p:oleObj spid="_x0000_s4142" name="Equation" r:id="rId27" imgW="114300" imgH="165100" progId="Equation.3">
+                <p:oleObj spid="_x0000_s4179" name="Equation" r:id="rId25" imgW="114300" imgH="165100" progId="Equation.3">
                   <p:embed/>
                 </p:oleObj>
               </mc:Choice>
               <mc:Fallback>
-                <p:oleObj name="Equation" r:id="rId27" imgW="114300" imgH="165100" progId="Equation.3">
+                <p:oleObj name="Equation" r:id="rId25" imgW="114300" imgH="165100" progId="Equation.3">
                   <p:embed/>
                   <p:pic>
                     <p:nvPicPr>
@@ -9217,7 +8927,7 @@
                       <p:nvPr/>
                     </p:nvPicPr>
                     <p:blipFill>
-                      <a:blip r:embed="rId28"/>
+                      <a:blip r:embed="rId26"/>
                       <a:stretch>
                         <a:fillRect/>
                       </a:stretch>
@@ -9242,6 +8952,2091 @@
     <p:extLst>
       <p:ext uri="{BB962C8B-B14F-4D97-AF65-F5344CB8AC3E}">
         <p14:creationId xmlns:p14="http://schemas.microsoft.com/office/powerpoint/2010/main" val="42257062"/>
+      </p:ext>
+    </p:extLst>
+  </p:cSld>
+  <p:clrMapOvr>
+    <a:masterClrMapping/>
+  </p:clrMapOvr>
+</p:sld>
+</file>
+
+<file path=ppt/slides/slide5.xml><?xml version="1.0" encoding="utf-8"?>
+<p:sld xmlns:a="http://schemas.openxmlformats.org/drawingml/2006/main" xmlns:r="http://schemas.openxmlformats.org/officeDocument/2006/relationships" xmlns:p="http://schemas.openxmlformats.org/presentationml/2006/main">
+  <p:cSld>
+    <p:spTree>
+      <p:nvGrpSpPr>
+        <p:cNvPr id="1" name=""/>
+        <p:cNvGrpSpPr/>
+        <p:nvPr/>
+      </p:nvGrpSpPr>
+      <p:grpSpPr>
+        <a:xfrm>
+          <a:off x="0" y="0"/>
+          <a:ext cx="0" cy="0"/>
+          <a:chOff x="0" y="0"/>
+          <a:chExt cx="0" cy="0"/>
+        </a:xfrm>
+      </p:grpSpPr>
+      <p:sp>
+        <p:nvSpPr>
+          <p:cNvPr id="4" name="Oval 3"/>
+          <p:cNvSpPr/>
+          <p:nvPr/>
+        </p:nvSpPr>
+        <p:spPr>
+          <a:xfrm rot="20239385">
+            <a:off x="1398243" y="1797174"/>
+            <a:ext cx="6865129" cy="3230992"/>
+          </a:xfrm>
+          <a:prstGeom prst="ellipse">
+            <a:avLst/>
+          </a:prstGeom>
+        </p:spPr>
+        <p:style>
+          <a:lnRef idx="2">
+            <a:schemeClr val="dk1"/>
+          </a:lnRef>
+          <a:fillRef idx="1">
+            <a:schemeClr val="lt1"/>
+          </a:fillRef>
+          <a:effectRef idx="0">
+            <a:schemeClr val="dk1"/>
+          </a:effectRef>
+          <a:fontRef idx="minor">
+            <a:schemeClr val="dk1"/>
+          </a:fontRef>
+        </p:style>
+        <p:txBody>
+          <a:bodyPr rtlCol="0" anchor="ctr"/>
+          <a:lstStyle/>
+          <a:p>
+            <a:pPr algn="ctr"/>
+            <a:endParaRPr lang="en-US"/>
+          </a:p>
+        </p:txBody>
+      </p:sp>
+      <p:sp>
+        <p:nvSpPr>
+          <p:cNvPr id="5" name="Oval 4"/>
+          <p:cNvSpPr/>
+          <p:nvPr/>
+        </p:nvSpPr>
+        <p:spPr>
+          <a:xfrm rot="20239385">
+            <a:off x="1895451" y="2067614"/>
+            <a:ext cx="5883008" cy="2680750"/>
+          </a:xfrm>
+          <a:prstGeom prst="ellipse">
+            <a:avLst/>
+          </a:prstGeom>
+        </p:spPr>
+        <p:style>
+          <a:lnRef idx="2">
+            <a:schemeClr val="dk1"/>
+          </a:lnRef>
+          <a:fillRef idx="1">
+            <a:schemeClr val="lt1"/>
+          </a:fillRef>
+          <a:effectRef idx="0">
+            <a:schemeClr val="dk1"/>
+          </a:effectRef>
+          <a:fontRef idx="minor">
+            <a:schemeClr val="dk1"/>
+          </a:fontRef>
+        </p:style>
+        <p:txBody>
+          <a:bodyPr rtlCol="0" anchor="ctr"/>
+          <a:lstStyle/>
+          <a:p>
+            <a:pPr algn="ctr"/>
+            <a:endParaRPr lang="en-US"/>
+          </a:p>
+        </p:txBody>
+      </p:sp>
+      <p:sp>
+        <p:nvSpPr>
+          <p:cNvPr id="6" name="Oval 5"/>
+          <p:cNvSpPr/>
+          <p:nvPr/>
+        </p:nvSpPr>
+        <p:spPr>
+          <a:xfrm rot="20239385">
+            <a:off x="2314054" y="2397570"/>
+            <a:ext cx="5086143" cy="2061197"/>
+          </a:xfrm>
+          <a:prstGeom prst="ellipse">
+            <a:avLst/>
+          </a:prstGeom>
+        </p:spPr>
+        <p:style>
+          <a:lnRef idx="2">
+            <a:schemeClr val="dk1"/>
+          </a:lnRef>
+          <a:fillRef idx="1">
+            <a:schemeClr val="lt1"/>
+          </a:fillRef>
+          <a:effectRef idx="0">
+            <a:schemeClr val="dk1"/>
+          </a:effectRef>
+          <a:fontRef idx="minor">
+            <a:schemeClr val="dk1"/>
+          </a:fontRef>
+        </p:style>
+        <p:txBody>
+          <a:bodyPr rtlCol="0" anchor="ctr"/>
+          <a:lstStyle/>
+          <a:p>
+            <a:pPr algn="ctr"/>
+            <a:endParaRPr lang="en-US"/>
+          </a:p>
+        </p:txBody>
+      </p:sp>
+      <p:sp>
+        <p:nvSpPr>
+          <p:cNvPr id="7" name="Oval 6"/>
+          <p:cNvSpPr/>
+          <p:nvPr/>
+        </p:nvSpPr>
+        <p:spPr>
+          <a:xfrm rot="20239385">
+            <a:off x="2821495" y="2649101"/>
+            <a:ext cx="4145962" cy="1614159"/>
+          </a:xfrm>
+          <a:prstGeom prst="ellipse">
+            <a:avLst/>
+          </a:prstGeom>
+        </p:spPr>
+        <p:style>
+          <a:lnRef idx="2">
+            <a:schemeClr val="dk1"/>
+          </a:lnRef>
+          <a:fillRef idx="1">
+            <a:schemeClr val="lt1"/>
+          </a:fillRef>
+          <a:effectRef idx="0">
+            <a:schemeClr val="dk1"/>
+          </a:effectRef>
+          <a:fontRef idx="minor">
+            <a:schemeClr val="dk1"/>
+          </a:fontRef>
+        </p:style>
+        <p:txBody>
+          <a:bodyPr rtlCol="0" anchor="ctr"/>
+          <a:lstStyle/>
+          <a:p>
+            <a:pPr algn="ctr"/>
+            <a:endParaRPr lang="en-US"/>
+          </a:p>
+        </p:txBody>
+      </p:sp>
+      <p:sp>
+        <p:nvSpPr>
+          <p:cNvPr id="8" name="Oval 7"/>
+          <p:cNvSpPr/>
+          <p:nvPr/>
+        </p:nvSpPr>
+        <p:spPr>
+          <a:xfrm rot="20239385">
+            <a:off x="3254329" y="2933518"/>
+            <a:ext cx="3264596" cy="1067007"/>
+          </a:xfrm>
+          <a:prstGeom prst="ellipse">
+            <a:avLst/>
+          </a:prstGeom>
+        </p:spPr>
+        <p:style>
+          <a:lnRef idx="2">
+            <a:schemeClr val="dk1"/>
+          </a:lnRef>
+          <a:fillRef idx="1">
+            <a:schemeClr val="lt1"/>
+          </a:fillRef>
+          <a:effectRef idx="0">
+            <a:schemeClr val="dk1"/>
+          </a:effectRef>
+          <a:fontRef idx="minor">
+            <a:schemeClr val="dk1"/>
+          </a:fontRef>
+        </p:style>
+        <p:txBody>
+          <a:bodyPr rtlCol="0" anchor="ctr"/>
+          <a:lstStyle/>
+          <a:p>
+            <a:pPr algn="ctr"/>
+            <a:endParaRPr lang="en-US"/>
+          </a:p>
+        </p:txBody>
+      </p:sp>
+      <p:sp>
+        <p:nvSpPr>
+          <p:cNvPr id="9" name="Oval 8"/>
+          <p:cNvSpPr/>
+          <p:nvPr/>
+        </p:nvSpPr>
+        <p:spPr>
+          <a:xfrm rot="20239385">
+            <a:off x="3771256" y="3171333"/>
+            <a:ext cx="2215056" cy="631732"/>
+          </a:xfrm>
+          <a:prstGeom prst="ellipse">
+            <a:avLst/>
+          </a:prstGeom>
+        </p:spPr>
+        <p:style>
+          <a:lnRef idx="2">
+            <a:schemeClr val="dk1"/>
+          </a:lnRef>
+          <a:fillRef idx="1">
+            <a:schemeClr val="lt1"/>
+          </a:fillRef>
+          <a:effectRef idx="0">
+            <a:schemeClr val="dk1"/>
+          </a:effectRef>
+          <a:fontRef idx="minor">
+            <a:schemeClr val="dk1"/>
+          </a:fontRef>
+        </p:style>
+        <p:txBody>
+          <a:bodyPr rtlCol="0" anchor="ctr"/>
+          <a:lstStyle/>
+          <a:p>
+            <a:pPr algn="ctr"/>
+            <a:endParaRPr lang="en-US"/>
+          </a:p>
+        </p:txBody>
+      </p:sp>
+      <p:cxnSp>
+        <p:nvCxnSpPr>
+          <p:cNvPr id="11" name="Straight Arrow Connector 10"/>
+          <p:cNvCxnSpPr/>
+          <p:nvPr/>
+        </p:nvCxnSpPr>
+        <p:spPr>
+          <a:xfrm flipH="1" flipV="1">
+            <a:off x="3174831" y="4827447"/>
+            <a:ext cx="2" cy="582117"/>
+          </a:xfrm>
+          <a:prstGeom prst="straightConnector1">
+            <a:avLst/>
+          </a:prstGeom>
+          <a:ln>
+            <a:solidFill>
+              <a:srgbClr val="FF0000"/>
+            </a:solidFill>
+            <a:tailEnd type="arrow"/>
+          </a:ln>
+        </p:spPr>
+        <p:style>
+          <a:lnRef idx="1">
+            <a:schemeClr val="dk1"/>
+          </a:lnRef>
+          <a:fillRef idx="0">
+            <a:schemeClr val="dk1"/>
+          </a:fillRef>
+          <a:effectRef idx="0">
+            <a:schemeClr val="dk1"/>
+          </a:effectRef>
+          <a:fontRef idx="minor">
+            <a:schemeClr val="tx1"/>
+          </a:fontRef>
+        </p:style>
+      </p:cxnSp>
+      <p:cxnSp>
+        <p:nvCxnSpPr>
+          <p:cNvPr id="30" name="Straight Arrow Connector 29"/>
+          <p:cNvCxnSpPr/>
+          <p:nvPr/>
+        </p:nvCxnSpPr>
+        <p:spPr>
+          <a:xfrm flipV="1">
+            <a:off x="3174835" y="4455082"/>
+            <a:ext cx="46739" cy="372366"/>
+          </a:xfrm>
+          <a:prstGeom prst="straightConnector1">
+            <a:avLst/>
+          </a:prstGeom>
+          <a:ln>
+            <a:solidFill>
+              <a:srgbClr val="FF0000"/>
+            </a:solidFill>
+            <a:tailEnd type="arrow"/>
+          </a:ln>
+        </p:spPr>
+        <p:style>
+          <a:lnRef idx="1">
+            <a:schemeClr val="dk1"/>
+          </a:lnRef>
+          <a:fillRef idx="0">
+            <a:schemeClr val="dk1"/>
+          </a:fillRef>
+          <a:effectRef idx="0">
+            <a:schemeClr val="dk1"/>
+          </a:effectRef>
+          <a:fontRef idx="minor">
+            <a:schemeClr val="tx1"/>
+          </a:fontRef>
+        </p:style>
+      </p:cxnSp>
+      <p:cxnSp>
+        <p:nvCxnSpPr>
+          <p:cNvPr id="32" name="Straight Arrow Connector 31"/>
+          <p:cNvCxnSpPr/>
+          <p:nvPr/>
+        </p:nvCxnSpPr>
+        <p:spPr>
+          <a:xfrm flipV="1">
+            <a:off x="3221574" y="4248951"/>
+            <a:ext cx="113037" cy="206131"/>
+          </a:xfrm>
+          <a:prstGeom prst="straightConnector1">
+            <a:avLst/>
+          </a:prstGeom>
+          <a:ln>
+            <a:solidFill>
+              <a:srgbClr val="FF0000"/>
+            </a:solidFill>
+            <a:tailEnd type="arrow"/>
+          </a:ln>
+        </p:spPr>
+        <p:style>
+          <a:lnRef idx="1">
+            <a:schemeClr val="dk1"/>
+          </a:lnRef>
+          <a:fillRef idx="0">
+            <a:schemeClr val="dk1"/>
+          </a:fillRef>
+          <a:effectRef idx="0">
+            <a:schemeClr val="dk1"/>
+          </a:effectRef>
+          <a:fontRef idx="minor">
+            <a:schemeClr val="tx1"/>
+          </a:fontRef>
+        </p:style>
+      </p:cxnSp>
+      <p:cxnSp>
+        <p:nvCxnSpPr>
+          <p:cNvPr id="34" name="Straight Arrow Connector 33"/>
+          <p:cNvCxnSpPr/>
+          <p:nvPr/>
+        </p:nvCxnSpPr>
+        <p:spPr>
+          <a:xfrm flipV="1">
+            <a:off x="3337936" y="4159185"/>
+            <a:ext cx="118872" cy="93092"/>
+          </a:xfrm>
+          <a:prstGeom prst="straightConnector1">
+            <a:avLst/>
+          </a:prstGeom>
+          <a:ln>
+            <a:solidFill>
+              <a:srgbClr val="FF0000"/>
+            </a:solidFill>
+            <a:tailEnd type="arrow"/>
+          </a:ln>
+        </p:spPr>
+        <p:style>
+          <a:lnRef idx="1">
+            <a:schemeClr val="dk1"/>
+          </a:lnRef>
+          <a:fillRef idx="0">
+            <a:schemeClr val="dk1"/>
+          </a:fillRef>
+          <a:effectRef idx="0">
+            <a:schemeClr val="dk1"/>
+          </a:effectRef>
+          <a:fontRef idx="minor">
+            <a:schemeClr val="tx1"/>
+          </a:fontRef>
+        </p:style>
+      </p:cxnSp>
+    </p:spTree>
+    <p:extLst>
+      <p:ext uri="{BB962C8B-B14F-4D97-AF65-F5344CB8AC3E}">
+        <p14:creationId xmlns:p14="http://schemas.microsoft.com/office/powerpoint/2010/main" val="1857380799"/>
+      </p:ext>
+    </p:extLst>
+  </p:cSld>
+  <p:clrMapOvr>
+    <a:masterClrMapping/>
+  </p:clrMapOvr>
+</p:sld>
+</file>
+
+<file path=ppt/slides/slide6.xml><?xml version="1.0" encoding="utf-8"?>
+<p:sld xmlns:a="http://schemas.openxmlformats.org/drawingml/2006/main" xmlns:r="http://schemas.openxmlformats.org/officeDocument/2006/relationships" xmlns:p="http://schemas.openxmlformats.org/presentationml/2006/main">
+  <p:cSld>
+    <p:spTree>
+      <p:nvGrpSpPr>
+        <p:cNvPr id="1" name=""/>
+        <p:cNvGrpSpPr/>
+        <p:nvPr/>
+      </p:nvGrpSpPr>
+      <p:grpSpPr>
+        <a:xfrm>
+          <a:off x="0" y="0"/>
+          <a:ext cx="0" cy="0"/>
+          <a:chOff x="0" y="0"/>
+          <a:chExt cx="0" cy="0"/>
+        </a:xfrm>
+      </p:grpSpPr>
+      <p:sp>
+        <p:nvSpPr>
+          <p:cNvPr id="4" name="Oval 3"/>
+          <p:cNvSpPr/>
+          <p:nvPr/>
+        </p:nvSpPr>
+        <p:spPr>
+          <a:xfrm>
+            <a:off x="1785620" y="5163108"/>
+            <a:ext cx="903111" cy="903111"/>
+          </a:xfrm>
+          <a:prstGeom prst="ellipse">
+            <a:avLst/>
+          </a:prstGeom>
+          <a:noFill/>
+        </p:spPr>
+        <p:style>
+          <a:lnRef idx="2">
+            <a:schemeClr val="dk1"/>
+          </a:lnRef>
+          <a:fillRef idx="1">
+            <a:schemeClr val="lt1"/>
+          </a:fillRef>
+          <a:effectRef idx="0">
+            <a:schemeClr val="dk1"/>
+          </a:effectRef>
+          <a:fontRef idx="minor">
+            <a:schemeClr val="dk1"/>
+          </a:fontRef>
+        </p:style>
+        <p:txBody>
+          <a:bodyPr rtlCol="0" anchor="ctr"/>
+          <a:lstStyle/>
+          <a:p>
+            <a:pPr algn="ctr"/>
+            <a:endParaRPr lang="en-US"/>
+          </a:p>
+        </p:txBody>
+      </p:sp>
+      <p:sp>
+        <p:nvSpPr>
+          <p:cNvPr id="5" name="Oval 4"/>
+          <p:cNvSpPr/>
+          <p:nvPr/>
+        </p:nvSpPr>
+        <p:spPr>
+          <a:xfrm>
+            <a:off x="4181686" y="5163108"/>
+            <a:ext cx="903111" cy="903111"/>
+          </a:xfrm>
+          <a:prstGeom prst="ellipse">
+            <a:avLst/>
+          </a:prstGeom>
+          <a:noFill/>
+        </p:spPr>
+        <p:style>
+          <a:lnRef idx="2">
+            <a:schemeClr val="dk1"/>
+          </a:lnRef>
+          <a:fillRef idx="1">
+            <a:schemeClr val="lt1"/>
+          </a:fillRef>
+          <a:effectRef idx="0">
+            <a:schemeClr val="dk1"/>
+          </a:effectRef>
+          <a:fontRef idx="minor">
+            <a:schemeClr val="dk1"/>
+          </a:fontRef>
+        </p:style>
+        <p:txBody>
+          <a:bodyPr rtlCol="0" anchor="ctr"/>
+          <a:lstStyle/>
+          <a:p>
+            <a:pPr algn="ctr"/>
+            <a:endParaRPr lang="en-US"/>
+          </a:p>
+        </p:txBody>
+      </p:sp>
+      <p:sp>
+        <p:nvSpPr>
+          <p:cNvPr id="6" name="Oval 5"/>
+          <p:cNvSpPr/>
+          <p:nvPr/>
+        </p:nvSpPr>
+        <p:spPr>
+          <a:xfrm>
+            <a:off x="6577752" y="5163108"/>
+            <a:ext cx="903111" cy="903111"/>
+          </a:xfrm>
+          <a:prstGeom prst="ellipse">
+            <a:avLst/>
+          </a:prstGeom>
+          <a:noFill/>
+        </p:spPr>
+        <p:style>
+          <a:lnRef idx="2">
+            <a:schemeClr val="dk1"/>
+          </a:lnRef>
+          <a:fillRef idx="1">
+            <a:schemeClr val="lt1"/>
+          </a:fillRef>
+          <a:effectRef idx="0">
+            <a:schemeClr val="dk1"/>
+          </a:effectRef>
+          <a:fontRef idx="minor">
+            <a:schemeClr val="dk1"/>
+          </a:fontRef>
+        </p:style>
+        <p:txBody>
+          <a:bodyPr rtlCol="0" anchor="ctr"/>
+          <a:lstStyle/>
+          <a:p>
+            <a:pPr algn="ctr"/>
+            <a:endParaRPr lang="en-US"/>
+          </a:p>
+        </p:txBody>
+      </p:sp>
+      <p:sp>
+        <p:nvSpPr>
+          <p:cNvPr id="7" name="Oval 6"/>
+          <p:cNvSpPr/>
+          <p:nvPr/>
+        </p:nvSpPr>
+        <p:spPr>
+          <a:xfrm>
+            <a:off x="1785620" y="3017750"/>
+            <a:ext cx="903111" cy="903111"/>
+          </a:xfrm>
+          <a:prstGeom prst="ellipse">
+            <a:avLst/>
+          </a:prstGeom>
+          <a:noFill/>
+        </p:spPr>
+        <p:style>
+          <a:lnRef idx="2">
+            <a:schemeClr val="dk1"/>
+          </a:lnRef>
+          <a:fillRef idx="1">
+            <a:schemeClr val="lt1"/>
+          </a:fillRef>
+          <a:effectRef idx="0">
+            <a:schemeClr val="dk1"/>
+          </a:effectRef>
+          <a:fontRef idx="minor">
+            <a:schemeClr val="dk1"/>
+          </a:fontRef>
+        </p:style>
+        <p:txBody>
+          <a:bodyPr rtlCol="0" anchor="ctr"/>
+          <a:lstStyle/>
+          <a:p>
+            <a:pPr algn="ctr"/>
+            <a:endParaRPr lang="en-US"/>
+          </a:p>
+        </p:txBody>
+      </p:sp>
+      <p:sp>
+        <p:nvSpPr>
+          <p:cNvPr id="8" name="Oval 7"/>
+          <p:cNvSpPr/>
+          <p:nvPr/>
+        </p:nvSpPr>
+        <p:spPr>
+          <a:xfrm>
+            <a:off x="4181686" y="3017750"/>
+            <a:ext cx="903111" cy="903111"/>
+          </a:xfrm>
+          <a:prstGeom prst="ellipse">
+            <a:avLst/>
+          </a:prstGeom>
+          <a:noFill/>
+        </p:spPr>
+        <p:style>
+          <a:lnRef idx="2">
+            <a:schemeClr val="dk1"/>
+          </a:lnRef>
+          <a:fillRef idx="1">
+            <a:schemeClr val="lt1"/>
+          </a:fillRef>
+          <a:effectRef idx="0">
+            <a:schemeClr val="dk1"/>
+          </a:effectRef>
+          <a:fontRef idx="minor">
+            <a:schemeClr val="dk1"/>
+          </a:fontRef>
+        </p:style>
+        <p:txBody>
+          <a:bodyPr rtlCol="0" anchor="ctr"/>
+          <a:lstStyle/>
+          <a:p>
+            <a:pPr algn="ctr"/>
+            <a:endParaRPr lang="en-US"/>
+          </a:p>
+        </p:txBody>
+      </p:sp>
+      <p:sp>
+        <p:nvSpPr>
+          <p:cNvPr id="9" name="Oval 8"/>
+          <p:cNvSpPr/>
+          <p:nvPr/>
+        </p:nvSpPr>
+        <p:spPr>
+          <a:xfrm>
+            <a:off x="6577752" y="3017750"/>
+            <a:ext cx="903111" cy="903111"/>
+          </a:xfrm>
+          <a:prstGeom prst="ellipse">
+            <a:avLst/>
+          </a:prstGeom>
+          <a:noFill/>
+        </p:spPr>
+        <p:style>
+          <a:lnRef idx="2">
+            <a:schemeClr val="dk1"/>
+          </a:lnRef>
+          <a:fillRef idx="1">
+            <a:schemeClr val="lt1"/>
+          </a:fillRef>
+          <a:effectRef idx="0">
+            <a:schemeClr val="dk1"/>
+          </a:effectRef>
+          <a:fontRef idx="minor">
+            <a:schemeClr val="dk1"/>
+          </a:fontRef>
+        </p:style>
+        <p:txBody>
+          <a:bodyPr rtlCol="0" anchor="ctr"/>
+          <a:lstStyle/>
+          <a:p>
+            <a:pPr algn="ctr"/>
+            <a:endParaRPr lang="en-US"/>
+          </a:p>
+        </p:txBody>
+      </p:sp>
+      <p:sp>
+        <p:nvSpPr>
+          <p:cNvPr id="13" name="Oval 12"/>
+          <p:cNvSpPr/>
+          <p:nvPr/>
+        </p:nvSpPr>
+        <p:spPr>
+          <a:xfrm>
+            <a:off x="1785620" y="874188"/>
+            <a:ext cx="903111" cy="903111"/>
+          </a:xfrm>
+          <a:prstGeom prst="ellipse">
+            <a:avLst/>
+          </a:prstGeom>
+          <a:noFill/>
+        </p:spPr>
+        <p:style>
+          <a:lnRef idx="2">
+            <a:schemeClr val="dk1"/>
+          </a:lnRef>
+          <a:fillRef idx="1">
+            <a:schemeClr val="lt1"/>
+          </a:fillRef>
+          <a:effectRef idx="0">
+            <a:schemeClr val="dk1"/>
+          </a:effectRef>
+          <a:fontRef idx="minor">
+            <a:schemeClr val="dk1"/>
+          </a:fontRef>
+        </p:style>
+        <p:txBody>
+          <a:bodyPr rtlCol="0" anchor="ctr"/>
+          <a:lstStyle/>
+          <a:p>
+            <a:pPr algn="ctr"/>
+            <a:endParaRPr lang="en-US"/>
+          </a:p>
+        </p:txBody>
+      </p:sp>
+      <p:sp>
+        <p:nvSpPr>
+          <p:cNvPr id="14" name="Oval 13"/>
+          <p:cNvSpPr/>
+          <p:nvPr/>
+        </p:nvSpPr>
+        <p:spPr>
+          <a:xfrm>
+            <a:off x="4181686" y="874188"/>
+            <a:ext cx="903111" cy="903111"/>
+          </a:xfrm>
+          <a:prstGeom prst="ellipse">
+            <a:avLst/>
+          </a:prstGeom>
+          <a:noFill/>
+        </p:spPr>
+        <p:style>
+          <a:lnRef idx="2">
+            <a:schemeClr val="dk1"/>
+          </a:lnRef>
+          <a:fillRef idx="1">
+            <a:schemeClr val="lt1"/>
+          </a:fillRef>
+          <a:effectRef idx="0">
+            <a:schemeClr val="dk1"/>
+          </a:effectRef>
+          <a:fontRef idx="minor">
+            <a:schemeClr val="dk1"/>
+          </a:fontRef>
+        </p:style>
+        <p:txBody>
+          <a:bodyPr rtlCol="0" anchor="ctr"/>
+          <a:lstStyle/>
+          <a:p>
+            <a:pPr algn="ctr"/>
+            <a:endParaRPr lang="en-US"/>
+          </a:p>
+        </p:txBody>
+      </p:sp>
+      <p:sp>
+        <p:nvSpPr>
+          <p:cNvPr id="15" name="Oval 14"/>
+          <p:cNvSpPr/>
+          <p:nvPr/>
+        </p:nvSpPr>
+        <p:spPr>
+          <a:xfrm>
+            <a:off x="6577752" y="874188"/>
+            <a:ext cx="903111" cy="903111"/>
+          </a:xfrm>
+          <a:prstGeom prst="ellipse">
+            <a:avLst/>
+          </a:prstGeom>
+          <a:noFill/>
+        </p:spPr>
+        <p:style>
+          <a:lnRef idx="2">
+            <a:schemeClr val="dk1"/>
+          </a:lnRef>
+          <a:fillRef idx="1">
+            <a:schemeClr val="lt1"/>
+          </a:fillRef>
+          <a:effectRef idx="0">
+            <a:schemeClr val="dk1"/>
+          </a:effectRef>
+          <a:fontRef idx="minor">
+            <a:schemeClr val="dk1"/>
+          </a:fontRef>
+        </p:style>
+        <p:txBody>
+          <a:bodyPr rtlCol="0" anchor="ctr"/>
+          <a:lstStyle/>
+          <a:p>
+            <a:pPr algn="ctr"/>
+            <a:endParaRPr lang="en-US"/>
+          </a:p>
+        </p:txBody>
+      </p:sp>
+      <p:cxnSp>
+        <p:nvCxnSpPr>
+          <p:cNvPr id="16" name="Straight Arrow Connector 15"/>
+          <p:cNvCxnSpPr>
+            <a:stCxn id="4" idx="7"/>
+            <a:endCxn id="8" idx="3"/>
+          </p:cNvCxnSpPr>
+          <p:nvPr/>
+        </p:nvCxnSpPr>
+        <p:spPr>
+          <a:xfrm flipV="1">
+            <a:off x="2556473" y="3788603"/>
+            <a:ext cx="1757471" cy="1506763"/>
+          </a:xfrm>
+          <a:prstGeom prst="straightConnector1">
+            <a:avLst/>
+          </a:prstGeom>
+          <a:ln>
+            <a:tailEnd type="arrow"/>
+          </a:ln>
+        </p:spPr>
+        <p:style>
+          <a:lnRef idx="1">
+            <a:schemeClr val="dk1"/>
+          </a:lnRef>
+          <a:fillRef idx="0">
+            <a:schemeClr val="dk1"/>
+          </a:fillRef>
+          <a:effectRef idx="0">
+            <a:schemeClr val="dk1"/>
+          </a:effectRef>
+          <a:fontRef idx="minor">
+            <a:schemeClr val="tx1"/>
+          </a:fontRef>
+        </p:style>
+      </p:cxnSp>
+      <p:cxnSp>
+        <p:nvCxnSpPr>
+          <p:cNvPr id="19" name="Straight Arrow Connector 18"/>
+          <p:cNvCxnSpPr>
+            <a:stCxn id="8" idx="7"/>
+            <a:endCxn id="15" idx="3"/>
+          </p:cNvCxnSpPr>
+          <p:nvPr/>
+        </p:nvCxnSpPr>
+        <p:spPr>
+          <a:xfrm flipV="1">
+            <a:off x="4952539" y="1645041"/>
+            <a:ext cx="1757471" cy="1504967"/>
+          </a:xfrm>
+          <a:prstGeom prst="straightConnector1">
+            <a:avLst/>
+          </a:prstGeom>
+          <a:ln>
+            <a:tailEnd type="arrow"/>
+          </a:ln>
+        </p:spPr>
+        <p:style>
+          <a:lnRef idx="1">
+            <a:schemeClr val="dk1"/>
+          </a:lnRef>
+          <a:fillRef idx="0">
+            <a:schemeClr val="dk1"/>
+          </a:fillRef>
+          <a:effectRef idx="0">
+            <a:schemeClr val="dk1"/>
+          </a:effectRef>
+          <a:fontRef idx="minor">
+            <a:schemeClr val="tx1"/>
+          </a:fontRef>
+        </p:style>
+      </p:cxnSp>
+      <p:cxnSp>
+        <p:nvCxnSpPr>
+          <p:cNvPr id="22" name="Straight Arrow Connector 21"/>
+          <p:cNvCxnSpPr>
+            <a:stCxn id="8" idx="0"/>
+            <a:endCxn id="14" idx="4"/>
+          </p:cNvCxnSpPr>
+          <p:nvPr/>
+        </p:nvCxnSpPr>
+        <p:spPr>
+          <a:xfrm flipV="1">
+            <a:off x="4633242" y="1777299"/>
+            <a:ext cx="0" cy="1240451"/>
+          </a:xfrm>
+          <a:prstGeom prst="straightConnector1">
+            <a:avLst/>
+          </a:prstGeom>
+          <a:ln>
+            <a:tailEnd type="arrow"/>
+          </a:ln>
+        </p:spPr>
+        <p:style>
+          <a:lnRef idx="1">
+            <a:schemeClr val="dk1"/>
+          </a:lnRef>
+          <a:fillRef idx="0">
+            <a:schemeClr val="dk1"/>
+          </a:fillRef>
+          <a:effectRef idx="0">
+            <a:schemeClr val="dk1"/>
+          </a:effectRef>
+          <a:fontRef idx="minor">
+            <a:schemeClr val="tx1"/>
+          </a:fontRef>
+        </p:style>
+      </p:cxnSp>
+      <p:cxnSp>
+        <p:nvCxnSpPr>
+          <p:cNvPr id="25" name="Straight Arrow Connector 24"/>
+          <p:cNvCxnSpPr>
+            <a:stCxn id="8" idx="1"/>
+            <a:endCxn id="13" idx="5"/>
+          </p:cNvCxnSpPr>
+          <p:nvPr/>
+        </p:nvCxnSpPr>
+        <p:spPr>
+          <a:xfrm flipH="1" flipV="1">
+            <a:off x="2556473" y="1645041"/>
+            <a:ext cx="1757471" cy="1504967"/>
+          </a:xfrm>
+          <a:prstGeom prst="straightConnector1">
+            <a:avLst/>
+          </a:prstGeom>
+          <a:ln>
+            <a:tailEnd type="arrow"/>
+          </a:ln>
+        </p:spPr>
+        <p:style>
+          <a:lnRef idx="1">
+            <a:schemeClr val="dk1"/>
+          </a:lnRef>
+          <a:fillRef idx="0">
+            <a:schemeClr val="dk1"/>
+          </a:fillRef>
+          <a:effectRef idx="0">
+            <a:schemeClr val="dk1"/>
+          </a:effectRef>
+          <a:fontRef idx="minor">
+            <a:schemeClr val="tx1"/>
+          </a:fontRef>
+        </p:style>
+      </p:cxnSp>
+      <p:cxnSp>
+        <p:nvCxnSpPr>
+          <p:cNvPr id="28" name="Straight Arrow Connector 27"/>
+          <p:cNvCxnSpPr>
+            <a:stCxn id="6" idx="1"/>
+            <a:endCxn id="8" idx="5"/>
+          </p:cNvCxnSpPr>
+          <p:nvPr/>
+        </p:nvCxnSpPr>
+        <p:spPr>
+          <a:xfrm flipH="1" flipV="1">
+            <a:off x="4952539" y="3788603"/>
+            <a:ext cx="1757471" cy="1506763"/>
+          </a:xfrm>
+          <a:prstGeom prst="straightConnector1">
+            <a:avLst/>
+          </a:prstGeom>
+          <a:ln>
+            <a:tailEnd type="arrow"/>
+          </a:ln>
+        </p:spPr>
+        <p:style>
+          <a:lnRef idx="1">
+            <a:schemeClr val="dk1"/>
+          </a:lnRef>
+          <a:fillRef idx="0">
+            <a:schemeClr val="dk1"/>
+          </a:fillRef>
+          <a:effectRef idx="0">
+            <a:schemeClr val="dk1"/>
+          </a:effectRef>
+          <a:fontRef idx="minor">
+            <a:schemeClr val="tx1"/>
+          </a:fontRef>
+        </p:style>
+      </p:cxnSp>
+      <p:cxnSp>
+        <p:nvCxnSpPr>
+          <p:cNvPr id="31" name="Straight Arrow Connector 30"/>
+          <p:cNvCxnSpPr>
+            <a:stCxn id="5" idx="0"/>
+            <a:endCxn id="8" idx="4"/>
+          </p:cNvCxnSpPr>
+          <p:nvPr/>
+        </p:nvCxnSpPr>
+        <p:spPr>
+          <a:xfrm flipV="1">
+            <a:off x="4633242" y="3920861"/>
+            <a:ext cx="0" cy="1242247"/>
+          </a:xfrm>
+          <a:prstGeom prst="straightConnector1">
+            <a:avLst/>
+          </a:prstGeom>
+          <a:ln>
+            <a:tailEnd type="arrow"/>
+          </a:ln>
+        </p:spPr>
+        <p:style>
+          <a:lnRef idx="1">
+            <a:schemeClr val="dk1"/>
+          </a:lnRef>
+          <a:fillRef idx="0">
+            <a:schemeClr val="dk1"/>
+          </a:fillRef>
+          <a:effectRef idx="0">
+            <a:schemeClr val="dk1"/>
+          </a:effectRef>
+          <a:fontRef idx="minor">
+            <a:schemeClr val="tx1"/>
+          </a:fontRef>
+        </p:style>
+      </p:cxnSp>
+      <p:cxnSp>
+        <p:nvCxnSpPr>
+          <p:cNvPr id="34" name="Straight Arrow Connector 33"/>
+          <p:cNvCxnSpPr>
+            <a:stCxn id="7" idx="7"/>
+            <a:endCxn id="14" idx="3"/>
+          </p:cNvCxnSpPr>
+          <p:nvPr/>
+        </p:nvCxnSpPr>
+        <p:spPr>
+          <a:xfrm flipV="1">
+            <a:off x="2556473" y="1645041"/>
+            <a:ext cx="1757471" cy="1504967"/>
+          </a:xfrm>
+          <a:prstGeom prst="straightConnector1">
+            <a:avLst/>
+          </a:prstGeom>
+          <a:ln>
+            <a:tailEnd type="arrow"/>
+          </a:ln>
+        </p:spPr>
+        <p:style>
+          <a:lnRef idx="1">
+            <a:schemeClr val="dk1"/>
+          </a:lnRef>
+          <a:fillRef idx="0">
+            <a:schemeClr val="dk1"/>
+          </a:fillRef>
+          <a:effectRef idx="0">
+            <a:schemeClr val="dk1"/>
+          </a:effectRef>
+          <a:fontRef idx="minor">
+            <a:schemeClr val="tx1"/>
+          </a:fontRef>
+        </p:style>
+      </p:cxnSp>
+      <p:cxnSp>
+        <p:nvCxnSpPr>
+          <p:cNvPr id="38" name="Straight Arrow Connector 37"/>
+          <p:cNvCxnSpPr>
+            <a:stCxn id="9" idx="1"/>
+            <a:endCxn id="14" idx="5"/>
+          </p:cNvCxnSpPr>
+          <p:nvPr/>
+        </p:nvCxnSpPr>
+        <p:spPr>
+          <a:xfrm flipH="1" flipV="1">
+            <a:off x="4952539" y="1645041"/>
+            <a:ext cx="1757471" cy="1504967"/>
+          </a:xfrm>
+          <a:prstGeom prst="straightConnector1">
+            <a:avLst/>
+          </a:prstGeom>
+          <a:ln>
+            <a:tailEnd type="arrow"/>
+          </a:ln>
+        </p:spPr>
+        <p:style>
+          <a:lnRef idx="1">
+            <a:schemeClr val="dk1"/>
+          </a:lnRef>
+          <a:fillRef idx="0">
+            <a:schemeClr val="dk1"/>
+          </a:fillRef>
+          <a:effectRef idx="0">
+            <a:schemeClr val="dk1"/>
+          </a:effectRef>
+          <a:fontRef idx="minor">
+            <a:schemeClr val="tx1"/>
+          </a:fontRef>
+        </p:style>
+      </p:cxnSp>
+      <p:graphicFrame>
+        <p:nvGraphicFramePr>
+          <p:cNvPr id="41" name="Object 40"/>
+          <p:cNvGraphicFramePr>
+            <a:graphicFrameLocks noChangeAspect="1"/>
+          </p:cNvGraphicFramePr>
+          <p:nvPr>
+            <p:extLst>
+              <p:ext uri="{D42A27DB-BD31-4B8C-83A1-F6EECF244321}">
+                <p14:modId xmlns:p14="http://schemas.microsoft.com/office/powerpoint/2010/main" val="243965469"/>
+              </p:ext>
+            </p:extLst>
+          </p:nvPr>
+        </p:nvGraphicFramePr>
+        <p:xfrm>
+          <a:off x="4551007" y="3250120"/>
+          <a:ext cx="279400" cy="457200"/>
+        </p:xfrm>
+        <a:graphic>
+          <a:graphicData uri="http://schemas.openxmlformats.org/presentationml/2006/ole">
+            <mc:AlternateContent xmlns:mc="http://schemas.openxmlformats.org/markup-compatibility/2006">
+              <mc:Choice xmlns:v="urn:schemas-microsoft-com:vml" Requires="v">
+                <p:oleObj spid="_x0000_s6150" name="Equation" r:id="rId3" imgW="139700" imgH="228600" progId="Equation.3">
+                  <p:embed/>
+                </p:oleObj>
+              </mc:Choice>
+              <mc:Fallback>
+                <p:oleObj name="Equation" r:id="rId3" imgW="139700" imgH="228600" progId="Equation.3">
+                  <p:embed/>
+                  <p:pic>
+                    <p:nvPicPr>
+                      <p:cNvPr id="0" name=""/>
+                      <p:cNvPicPr/>
+                      <p:nvPr/>
+                    </p:nvPicPr>
+                    <p:blipFill>
+                      <a:blip r:embed="rId4">
+                        <a:alphaModFix/>
+                      </a:blip>
+                      <a:stretch>
+                        <a:fillRect/>
+                      </a:stretch>
+                    </p:blipFill>
+                    <p:spPr>
+                      <a:xfrm>
+                        <a:off x="4551007" y="3250120"/>
+                        <a:ext cx="279400" cy="457200"/>
+                      </a:xfrm>
+                      <a:prstGeom prst="rect">
+                        <a:avLst/>
+                      </a:prstGeom>
+                    </p:spPr>
+                  </p:pic>
+                </p:oleObj>
+              </mc:Fallback>
+            </mc:AlternateContent>
+          </a:graphicData>
+        </a:graphic>
+      </p:graphicFrame>
+      <p:graphicFrame>
+        <p:nvGraphicFramePr>
+          <p:cNvPr id="42" name="Object 41"/>
+          <p:cNvGraphicFramePr>
+            <a:graphicFrameLocks noChangeAspect="1"/>
+          </p:cNvGraphicFramePr>
+          <p:nvPr>
+            <p:extLst>
+              <p:ext uri="{D42A27DB-BD31-4B8C-83A1-F6EECF244321}">
+                <p14:modId xmlns:p14="http://schemas.microsoft.com/office/powerpoint/2010/main" val="845483840"/>
+              </p:ext>
+            </p:extLst>
+          </p:nvPr>
+        </p:nvGraphicFramePr>
+        <p:xfrm>
+          <a:off x="4509129" y="1095323"/>
+          <a:ext cx="330200" cy="457200"/>
+        </p:xfrm>
+        <a:graphic>
+          <a:graphicData uri="http://schemas.openxmlformats.org/presentationml/2006/ole">
+            <mc:AlternateContent xmlns:mc="http://schemas.openxmlformats.org/markup-compatibility/2006">
+              <mc:Choice xmlns:v="urn:schemas-microsoft-com:vml" Requires="v">
+                <p:oleObj spid="_x0000_s6151" name="Equation" r:id="rId5" imgW="165100" imgH="228600" progId="Equation.3">
+                  <p:embed/>
+                </p:oleObj>
+              </mc:Choice>
+              <mc:Fallback>
+                <p:oleObj name="Equation" r:id="rId5" imgW="165100" imgH="228600" progId="Equation.3">
+                  <p:embed/>
+                  <p:pic>
+                    <p:nvPicPr>
+                      <p:cNvPr id="0" name=""/>
+                      <p:cNvPicPr/>
+                      <p:nvPr/>
+                    </p:nvPicPr>
+                    <p:blipFill>
+                      <a:blip r:embed="rId6">
+                        <a:alphaModFix/>
+                      </a:blip>
+                      <a:stretch>
+                        <a:fillRect/>
+                      </a:stretch>
+                    </p:blipFill>
+                    <p:spPr>
+                      <a:xfrm>
+                        <a:off x="4509129" y="1095323"/>
+                        <a:ext cx="330200" cy="457200"/>
+                      </a:xfrm>
+                      <a:prstGeom prst="rect">
+                        <a:avLst/>
+                      </a:prstGeom>
+                    </p:spPr>
+                  </p:pic>
+                </p:oleObj>
+              </mc:Fallback>
+            </mc:AlternateContent>
+          </a:graphicData>
+        </a:graphic>
+      </p:graphicFrame>
+      <p:cxnSp>
+        <p:nvCxnSpPr>
+          <p:cNvPr id="43" name="Straight Arrow Connector 42"/>
+          <p:cNvCxnSpPr>
+            <a:stCxn id="14" idx="0"/>
+          </p:cNvCxnSpPr>
+          <p:nvPr/>
+        </p:nvCxnSpPr>
+        <p:spPr>
+          <a:xfrm flipV="1">
+            <a:off x="4633242" y="322492"/>
+            <a:ext cx="0" cy="551696"/>
+          </a:xfrm>
+          <a:prstGeom prst="straightConnector1">
+            <a:avLst/>
+          </a:prstGeom>
+          <a:ln>
+            <a:tailEnd type="arrow"/>
+          </a:ln>
+        </p:spPr>
+        <p:style>
+          <a:lnRef idx="1">
+            <a:schemeClr val="dk1"/>
+          </a:lnRef>
+          <a:fillRef idx="0">
+            <a:schemeClr val="dk1"/>
+          </a:fillRef>
+          <a:effectRef idx="0">
+            <a:schemeClr val="dk1"/>
+          </a:effectRef>
+          <a:fontRef idx="minor">
+            <a:schemeClr val="tx1"/>
+          </a:fontRef>
+        </p:style>
+      </p:cxnSp>
+      <p:graphicFrame>
+        <p:nvGraphicFramePr>
+          <p:cNvPr id="46" name="Object 45"/>
+          <p:cNvGraphicFramePr>
+            <a:graphicFrameLocks noChangeAspect="1"/>
+          </p:cNvGraphicFramePr>
+          <p:nvPr>
+            <p:extLst>
+              <p:ext uri="{D42A27DB-BD31-4B8C-83A1-F6EECF244321}">
+                <p14:modId xmlns:p14="http://schemas.microsoft.com/office/powerpoint/2010/main" val="3329699391"/>
+              </p:ext>
+            </p:extLst>
+          </p:nvPr>
+        </p:nvGraphicFramePr>
+        <p:xfrm>
+          <a:off x="4344029" y="2535150"/>
+          <a:ext cx="330200" cy="482600"/>
+        </p:xfrm>
+        <a:graphic>
+          <a:graphicData uri="http://schemas.openxmlformats.org/presentationml/2006/ole">
+            <mc:AlternateContent xmlns:mc="http://schemas.openxmlformats.org/markup-compatibility/2006">
+              <mc:Choice xmlns:v="urn:schemas-microsoft-com:vml" Requires="v">
+                <p:oleObj spid="_x0000_s6152" name="Equation" r:id="rId7" imgW="165100" imgH="241300" progId="Equation.3">
+                  <p:embed/>
+                </p:oleObj>
+              </mc:Choice>
+              <mc:Fallback>
+                <p:oleObj name="Equation" r:id="rId7" imgW="165100" imgH="241300" progId="Equation.3">
+                  <p:embed/>
+                  <p:pic>
+                    <p:nvPicPr>
+                      <p:cNvPr id="0" name=""/>
+                      <p:cNvPicPr/>
+                      <p:nvPr/>
+                    </p:nvPicPr>
+                    <p:blipFill>
+                      <a:blip r:embed="rId8">
+                        <a:alphaModFix/>
+                      </a:blip>
+                      <a:stretch>
+                        <a:fillRect/>
+                      </a:stretch>
+                    </p:blipFill>
+                    <p:spPr>
+                      <a:xfrm>
+                        <a:off x="4344029" y="2535150"/>
+                        <a:ext cx="330200" cy="482600"/>
+                      </a:xfrm>
+                      <a:prstGeom prst="rect">
+                        <a:avLst/>
+                      </a:prstGeom>
+                    </p:spPr>
+                  </p:pic>
+                </p:oleObj>
+              </mc:Fallback>
+            </mc:AlternateContent>
+          </a:graphicData>
+        </a:graphic>
+      </p:graphicFrame>
+      <p:graphicFrame>
+        <p:nvGraphicFramePr>
+          <p:cNvPr id="47" name="Object 46"/>
+          <p:cNvGraphicFramePr>
+            <a:graphicFrameLocks noChangeAspect="1"/>
+          </p:cNvGraphicFramePr>
+          <p:nvPr>
+            <p:extLst>
+              <p:ext uri="{D42A27DB-BD31-4B8C-83A1-F6EECF244321}">
+                <p14:modId xmlns:p14="http://schemas.microsoft.com/office/powerpoint/2010/main" val="3947918767"/>
+              </p:ext>
+            </p:extLst>
+          </p:nvPr>
+        </p:nvGraphicFramePr>
+        <p:xfrm>
+          <a:off x="4733925" y="1646238"/>
+          <a:ext cx="330200" cy="508000"/>
+        </p:xfrm>
+        <a:graphic>
+          <a:graphicData uri="http://schemas.openxmlformats.org/presentationml/2006/ole">
+            <mc:AlternateContent xmlns:mc="http://schemas.openxmlformats.org/markup-compatibility/2006">
+              <mc:Choice xmlns:v="urn:schemas-microsoft-com:vml" Requires="v">
+                <p:oleObj spid="_x0000_s6153" name="Equation" r:id="rId9" imgW="165100" imgH="254000" progId="Equation.3">
+                  <p:embed/>
+                </p:oleObj>
+              </mc:Choice>
+              <mc:Fallback>
+                <p:oleObj name="Equation" r:id="rId9" imgW="165100" imgH="254000" progId="Equation.3">
+                  <p:embed/>
+                  <p:pic>
+                    <p:nvPicPr>
+                      <p:cNvPr id="0" name=""/>
+                      <p:cNvPicPr/>
+                      <p:nvPr/>
+                    </p:nvPicPr>
+                    <p:blipFill>
+                      <a:blip r:embed="rId10">
+                        <a:alphaModFix/>
+                      </a:blip>
+                      <a:stretch>
+                        <a:fillRect/>
+                      </a:stretch>
+                    </p:blipFill>
+                    <p:spPr>
+                      <a:xfrm>
+                        <a:off x="4733925" y="1646238"/>
+                        <a:ext cx="330200" cy="508000"/>
+                      </a:xfrm>
+                      <a:prstGeom prst="rect">
+                        <a:avLst/>
+                      </a:prstGeom>
+                    </p:spPr>
+                  </p:pic>
+                </p:oleObj>
+              </mc:Fallback>
+            </mc:AlternateContent>
+          </a:graphicData>
+        </a:graphic>
+      </p:graphicFrame>
+      <p:graphicFrame>
+        <p:nvGraphicFramePr>
+          <p:cNvPr id="48" name="Object 47"/>
+          <p:cNvGraphicFramePr>
+            <a:graphicFrameLocks noChangeAspect="1"/>
+          </p:cNvGraphicFramePr>
+          <p:nvPr>
+            <p:extLst>
+              <p:ext uri="{D42A27DB-BD31-4B8C-83A1-F6EECF244321}">
+                <p14:modId xmlns:p14="http://schemas.microsoft.com/office/powerpoint/2010/main" val="453788914"/>
+              </p:ext>
+            </p:extLst>
+          </p:nvPr>
+        </p:nvGraphicFramePr>
+        <p:xfrm>
+          <a:off x="4313238" y="379413"/>
+          <a:ext cx="330200" cy="508000"/>
+        </p:xfrm>
+        <a:graphic>
+          <a:graphicData uri="http://schemas.openxmlformats.org/presentationml/2006/ole">
+            <mc:AlternateContent xmlns:mc="http://schemas.openxmlformats.org/markup-compatibility/2006">
+              <mc:Choice xmlns:v="urn:schemas-microsoft-com:vml" Requires="v">
+                <p:oleObj spid="_x0000_s6154" name="Equation" r:id="rId11" imgW="165100" imgH="254000" progId="Equation.3">
+                  <p:embed/>
+                </p:oleObj>
+              </mc:Choice>
+              <mc:Fallback>
+                <p:oleObj name="Equation" r:id="rId11" imgW="165100" imgH="254000" progId="Equation.3">
+                  <p:embed/>
+                  <p:pic>
+                    <p:nvPicPr>
+                      <p:cNvPr id="0" name=""/>
+                      <p:cNvPicPr/>
+                      <p:nvPr/>
+                    </p:nvPicPr>
+                    <p:blipFill>
+                      <a:blip r:embed="rId12">
+                        <a:alphaModFix/>
+                      </a:blip>
+                      <a:stretch>
+                        <a:fillRect/>
+                      </a:stretch>
+                    </p:blipFill>
+                    <p:spPr>
+                      <a:xfrm>
+                        <a:off x="4313238" y="379413"/>
+                        <a:ext cx="330200" cy="508000"/>
+                      </a:xfrm>
+                      <a:prstGeom prst="rect">
+                        <a:avLst/>
+                      </a:prstGeom>
+                    </p:spPr>
+                  </p:pic>
+                </p:oleObj>
+              </mc:Fallback>
+            </mc:AlternateContent>
+          </a:graphicData>
+        </a:graphic>
+      </p:graphicFrame>
+    </p:spTree>
+    <p:extLst>
+      <p:ext uri="{BB962C8B-B14F-4D97-AF65-F5344CB8AC3E}">
+        <p14:creationId xmlns:p14="http://schemas.microsoft.com/office/powerpoint/2010/main" val="751073030"/>
+      </p:ext>
+    </p:extLst>
+  </p:cSld>
+  <p:clrMapOvr>
+    <a:masterClrMapping/>
+  </p:clrMapOvr>
+</p:sld>
+</file>
+
+<file path=ppt/slides/slide7.xml><?xml version="1.0" encoding="utf-8"?>
+<p:sld xmlns:a="http://schemas.openxmlformats.org/drawingml/2006/main" xmlns:r="http://schemas.openxmlformats.org/officeDocument/2006/relationships" xmlns:p="http://schemas.openxmlformats.org/presentationml/2006/main">
+  <p:cSld>
+    <p:spTree>
+      <p:nvGrpSpPr>
+        <p:cNvPr id="1" name=""/>
+        <p:cNvGrpSpPr/>
+        <p:nvPr/>
+      </p:nvGrpSpPr>
+      <p:grpSpPr>
+        <a:xfrm>
+          <a:off x="0" y="0"/>
+          <a:ext cx="0" cy="0"/>
+          <a:chOff x="0" y="0"/>
+          <a:chExt cx="0" cy="0"/>
+        </a:xfrm>
+      </p:grpSpPr>
+      <p:cxnSp>
+        <p:nvCxnSpPr>
+          <p:cNvPr id="5" name="Straight Connector 4"/>
+          <p:cNvCxnSpPr/>
+          <p:nvPr/>
+        </p:nvCxnSpPr>
+        <p:spPr>
+          <a:xfrm flipV="1">
+            <a:off x="1262052" y="3700459"/>
+            <a:ext cx="6913851" cy="0"/>
+          </a:xfrm>
+          <a:prstGeom prst="line">
+            <a:avLst/>
+          </a:prstGeom>
+          <a:ln>
+            <a:solidFill>
+              <a:schemeClr val="tx1"/>
+            </a:solidFill>
+          </a:ln>
+          <a:effectLst/>
+        </p:spPr>
+        <p:style>
+          <a:lnRef idx="2">
+            <a:schemeClr val="accent1"/>
+          </a:lnRef>
+          <a:fillRef idx="0">
+            <a:schemeClr val="accent1"/>
+          </a:fillRef>
+          <a:effectRef idx="1">
+            <a:schemeClr val="accent1"/>
+          </a:effectRef>
+          <a:fontRef idx="minor">
+            <a:schemeClr val="tx1"/>
+          </a:fontRef>
+        </p:style>
+      </p:cxnSp>
+      <p:cxnSp>
+        <p:nvCxnSpPr>
+          <p:cNvPr id="6" name="Straight Connector 5"/>
+          <p:cNvCxnSpPr/>
+          <p:nvPr/>
+        </p:nvCxnSpPr>
+        <p:spPr>
+          <a:xfrm>
+            <a:off x="4718978" y="1567991"/>
+            <a:ext cx="0" cy="4233575"/>
+          </a:xfrm>
+          <a:prstGeom prst="line">
+            <a:avLst/>
+          </a:prstGeom>
+          <a:ln>
+            <a:solidFill>
+              <a:schemeClr val="tx1"/>
+            </a:solidFill>
+          </a:ln>
+          <a:effectLst/>
+        </p:spPr>
+        <p:style>
+          <a:lnRef idx="2">
+            <a:schemeClr val="accent1"/>
+          </a:lnRef>
+          <a:fillRef idx="0">
+            <a:schemeClr val="accent1"/>
+          </a:fillRef>
+          <a:effectRef idx="1">
+            <a:schemeClr val="accent1"/>
+          </a:effectRef>
+          <a:fontRef idx="minor">
+            <a:schemeClr val="tx1"/>
+          </a:fontRef>
+        </p:style>
+      </p:cxnSp>
+      <p:sp>
+        <p:nvSpPr>
+          <p:cNvPr id="9" name="Oval 8"/>
+          <p:cNvSpPr/>
+          <p:nvPr/>
+        </p:nvSpPr>
+        <p:spPr>
+          <a:xfrm>
+            <a:off x="2916046" y="4453094"/>
+            <a:ext cx="47033" cy="47040"/>
+          </a:xfrm>
+          <a:prstGeom prst="ellipse">
+            <a:avLst/>
+          </a:prstGeom>
+          <a:ln/>
+        </p:spPr>
+        <p:style>
+          <a:lnRef idx="2">
+            <a:schemeClr val="dk1">
+              <a:shade val="50000"/>
+            </a:schemeClr>
+          </a:lnRef>
+          <a:fillRef idx="1">
+            <a:schemeClr val="dk1"/>
+          </a:fillRef>
+          <a:effectRef idx="0">
+            <a:schemeClr val="dk1"/>
+          </a:effectRef>
+          <a:fontRef idx="minor">
+            <a:schemeClr val="lt1"/>
+          </a:fontRef>
+        </p:style>
+        <p:txBody>
+          <a:bodyPr rtlCol="0" anchor="ctr"/>
+          <a:lstStyle/>
+          <a:p>
+            <a:pPr algn="ctr"/>
+            <a:endParaRPr lang="en-US"/>
+          </a:p>
+        </p:txBody>
+      </p:sp>
+      <p:sp>
+        <p:nvSpPr>
+          <p:cNvPr id="11" name="Oval 10"/>
+          <p:cNvSpPr/>
+          <p:nvPr/>
+        </p:nvSpPr>
+        <p:spPr>
+          <a:xfrm>
+            <a:off x="3930716" y="4581974"/>
+            <a:ext cx="47033" cy="47040"/>
+          </a:xfrm>
+          <a:prstGeom prst="ellipse">
+            <a:avLst/>
+          </a:prstGeom>
+          <a:ln/>
+        </p:spPr>
+        <p:style>
+          <a:lnRef idx="2">
+            <a:schemeClr val="dk1">
+              <a:shade val="50000"/>
+            </a:schemeClr>
+          </a:lnRef>
+          <a:fillRef idx="1">
+            <a:schemeClr val="dk1"/>
+          </a:fillRef>
+          <a:effectRef idx="0">
+            <a:schemeClr val="dk1"/>
+          </a:effectRef>
+          <a:fontRef idx="minor">
+            <a:schemeClr val="lt1"/>
+          </a:fontRef>
+        </p:style>
+        <p:txBody>
+          <a:bodyPr rtlCol="0" anchor="ctr"/>
+          <a:lstStyle/>
+          <a:p>
+            <a:pPr algn="ctr"/>
+            <a:endParaRPr lang="en-US"/>
+          </a:p>
+        </p:txBody>
+      </p:sp>
+      <p:sp>
+        <p:nvSpPr>
+          <p:cNvPr id="12" name="Oval 11"/>
+          <p:cNvSpPr/>
+          <p:nvPr/>
+        </p:nvSpPr>
+        <p:spPr>
+          <a:xfrm>
+            <a:off x="5102166" y="3150703"/>
+            <a:ext cx="47033" cy="47040"/>
+          </a:xfrm>
+          <a:prstGeom prst="ellipse">
+            <a:avLst/>
+          </a:prstGeom>
+          <a:ln/>
+        </p:spPr>
+        <p:style>
+          <a:lnRef idx="2">
+            <a:schemeClr val="dk1">
+              <a:shade val="50000"/>
+            </a:schemeClr>
+          </a:lnRef>
+          <a:fillRef idx="1">
+            <a:schemeClr val="dk1"/>
+          </a:fillRef>
+          <a:effectRef idx="0">
+            <a:schemeClr val="dk1"/>
+          </a:effectRef>
+          <a:fontRef idx="minor">
+            <a:schemeClr val="lt1"/>
+          </a:fontRef>
+        </p:style>
+        <p:txBody>
+          <a:bodyPr rtlCol="0" anchor="ctr"/>
+          <a:lstStyle/>
+          <a:p>
+            <a:pPr algn="ctr"/>
+            <a:endParaRPr lang="en-US"/>
+          </a:p>
+        </p:txBody>
+      </p:sp>
+      <p:sp>
+        <p:nvSpPr>
+          <p:cNvPr id="13" name="Oval 12"/>
+          <p:cNvSpPr/>
+          <p:nvPr/>
+        </p:nvSpPr>
+        <p:spPr>
+          <a:xfrm>
+            <a:off x="6806656" y="3098306"/>
+            <a:ext cx="47033" cy="47040"/>
+          </a:xfrm>
+          <a:prstGeom prst="ellipse">
+            <a:avLst/>
+          </a:prstGeom>
+          <a:ln/>
+        </p:spPr>
+        <p:style>
+          <a:lnRef idx="2">
+            <a:schemeClr val="dk1">
+              <a:shade val="50000"/>
+            </a:schemeClr>
+          </a:lnRef>
+          <a:fillRef idx="1">
+            <a:schemeClr val="dk1"/>
+          </a:fillRef>
+          <a:effectRef idx="0">
+            <a:schemeClr val="dk1"/>
+          </a:effectRef>
+          <a:fontRef idx="minor">
+            <a:schemeClr val="lt1"/>
+          </a:fontRef>
+        </p:style>
+        <p:txBody>
+          <a:bodyPr rtlCol="0" anchor="ctr"/>
+          <a:lstStyle/>
+          <a:p>
+            <a:pPr algn="ctr"/>
+            <a:endParaRPr lang="en-US"/>
+          </a:p>
+        </p:txBody>
+      </p:sp>
+      <p:sp>
+        <p:nvSpPr>
+          <p:cNvPr id="14" name="Oval 13"/>
+          <p:cNvSpPr/>
+          <p:nvPr/>
+        </p:nvSpPr>
+        <p:spPr>
+          <a:xfrm>
+            <a:off x="5924330" y="3074786"/>
+            <a:ext cx="47033" cy="47040"/>
+          </a:xfrm>
+          <a:prstGeom prst="ellipse">
+            <a:avLst/>
+          </a:prstGeom>
+          <a:ln/>
+        </p:spPr>
+        <p:style>
+          <a:lnRef idx="2">
+            <a:schemeClr val="dk1">
+              <a:shade val="50000"/>
+            </a:schemeClr>
+          </a:lnRef>
+          <a:fillRef idx="1">
+            <a:schemeClr val="dk1"/>
+          </a:fillRef>
+          <a:effectRef idx="0">
+            <a:schemeClr val="dk1"/>
+          </a:effectRef>
+          <a:fontRef idx="minor">
+            <a:schemeClr val="lt1"/>
+          </a:fontRef>
+        </p:style>
+        <p:txBody>
+          <a:bodyPr rtlCol="0" anchor="ctr"/>
+          <a:lstStyle/>
+          <a:p>
+            <a:pPr algn="ctr"/>
+            <a:endParaRPr lang="en-US"/>
+          </a:p>
+        </p:txBody>
+      </p:sp>
+      <p:sp>
+        <p:nvSpPr>
+          <p:cNvPr id="17" name="Oval 16"/>
+          <p:cNvSpPr/>
+          <p:nvPr/>
+        </p:nvSpPr>
+        <p:spPr>
+          <a:xfrm>
+            <a:off x="7158489" y="2098233"/>
+            <a:ext cx="47033" cy="47040"/>
+          </a:xfrm>
+          <a:prstGeom prst="ellipse">
+            <a:avLst/>
+          </a:prstGeom>
+          <a:ln/>
+        </p:spPr>
+        <p:style>
+          <a:lnRef idx="2">
+            <a:schemeClr val="dk1">
+              <a:shade val="50000"/>
+            </a:schemeClr>
+          </a:lnRef>
+          <a:fillRef idx="1">
+            <a:schemeClr val="dk1"/>
+          </a:fillRef>
+          <a:effectRef idx="0">
+            <a:schemeClr val="dk1"/>
+          </a:effectRef>
+          <a:fontRef idx="minor">
+            <a:schemeClr val="lt1"/>
+          </a:fontRef>
+        </p:style>
+        <p:txBody>
+          <a:bodyPr rtlCol="0" anchor="ctr"/>
+          <a:lstStyle/>
+          <a:p>
+            <a:pPr algn="ctr"/>
+            <a:endParaRPr lang="en-US"/>
+          </a:p>
+        </p:txBody>
+      </p:sp>
+      <p:sp>
+        <p:nvSpPr>
+          <p:cNvPr id="18" name="Oval 17"/>
+          <p:cNvSpPr/>
+          <p:nvPr/>
+        </p:nvSpPr>
+        <p:spPr>
+          <a:xfrm>
+            <a:off x="2206174" y="5311090"/>
+            <a:ext cx="47033" cy="47040"/>
+          </a:xfrm>
+          <a:prstGeom prst="ellipse">
+            <a:avLst/>
+          </a:prstGeom>
+          <a:ln/>
+        </p:spPr>
+        <p:style>
+          <a:lnRef idx="2">
+            <a:schemeClr val="dk1">
+              <a:shade val="50000"/>
+            </a:schemeClr>
+          </a:lnRef>
+          <a:fillRef idx="1">
+            <a:schemeClr val="dk1"/>
+          </a:fillRef>
+          <a:effectRef idx="0">
+            <a:schemeClr val="dk1"/>
+          </a:effectRef>
+          <a:fontRef idx="minor">
+            <a:schemeClr val="lt1"/>
+          </a:fontRef>
+        </p:style>
+        <p:txBody>
+          <a:bodyPr rtlCol="0" anchor="ctr"/>
+          <a:lstStyle/>
+          <a:p>
+            <a:pPr algn="ctr"/>
+            <a:endParaRPr lang="en-US"/>
+          </a:p>
+        </p:txBody>
+      </p:sp>
+      <p:sp>
+        <p:nvSpPr>
+          <p:cNvPr id="19" name="Oval 18"/>
+          <p:cNvSpPr/>
+          <p:nvPr/>
+        </p:nvSpPr>
+        <p:spPr>
+          <a:xfrm>
+            <a:off x="4208539" y="3919019"/>
+            <a:ext cx="47033" cy="47040"/>
+          </a:xfrm>
+          <a:prstGeom prst="ellipse">
+            <a:avLst/>
+          </a:prstGeom>
+          <a:ln/>
+        </p:spPr>
+        <p:style>
+          <a:lnRef idx="2">
+            <a:schemeClr val="dk1">
+              <a:shade val="50000"/>
+            </a:schemeClr>
+          </a:lnRef>
+          <a:fillRef idx="1">
+            <a:schemeClr val="dk1"/>
+          </a:fillRef>
+          <a:effectRef idx="0">
+            <a:schemeClr val="dk1"/>
+          </a:effectRef>
+          <a:fontRef idx="minor">
+            <a:schemeClr val="lt1"/>
+          </a:fontRef>
+        </p:style>
+        <p:txBody>
+          <a:bodyPr rtlCol="0" anchor="ctr"/>
+          <a:lstStyle/>
+          <a:p>
+            <a:pPr algn="ctr"/>
+            <a:endParaRPr lang="en-US"/>
+          </a:p>
+        </p:txBody>
+      </p:sp>
+      <p:cxnSp>
+        <p:nvCxnSpPr>
+          <p:cNvPr id="21" name="Straight Connector 20"/>
+          <p:cNvCxnSpPr/>
+          <p:nvPr/>
+        </p:nvCxnSpPr>
+        <p:spPr>
+          <a:xfrm flipV="1">
+            <a:off x="1708866" y="2289267"/>
+            <a:ext cx="5941836" cy="3068863"/>
+          </a:xfrm>
+          <a:prstGeom prst="line">
+            <a:avLst/>
+          </a:prstGeom>
+          <a:ln>
+            <a:solidFill>
+              <a:srgbClr val="FF0000"/>
+            </a:solidFill>
+          </a:ln>
+        </p:spPr>
+        <p:style>
+          <a:lnRef idx="1">
+            <a:schemeClr val="accent2"/>
+          </a:lnRef>
+          <a:fillRef idx="0">
+            <a:schemeClr val="accent2"/>
+          </a:fillRef>
+          <a:effectRef idx="0">
+            <a:schemeClr val="accent2"/>
+          </a:effectRef>
+          <a:fontRef idx="minor">
+            <a:schemeClr val="tx1"/>
+          </a:fontRef>
+        </p:style>
+      </p:cxnSp>
+      <p:sp>
+        <p:nvSpPr>
+          <p:cNvPr id="24" name="Freeform 23"/>
+          <p:cNvSpPr/>
+          <p:nvPr/>
+        </p:nvSpPr>
+        <p:spPr>
+          <a:xfrm>
+            <a:off x="1536411" y="1364137"/>
+            <a:ext cx="6004547" cy="4829427"/>
+          </a:xfrm>
+          <a:custGeom>
+            <a:avLst/>
+            <a:gdLst>
+              <a:gd name="connsiteX0" fmla="*/ 0 w 6004547"/>
+              <a:gd name="connsiteY0" fmla="*/ 4829427 h 4829427"/>
+              <a:gd name="connsiteX1" fmla="*/ 689818 w 6004547"/>
+              <a:gd name="connsiteY1" fmla="*/ 3967032 h 4829427"/>
+              <a:gd name="connsiteX2" fmla="*/ 1410991 w 6004547"/>
+              <a:gd name="connsiteY2" fmla="*/ 3104637 h 4829427"/>
+              <a:gd name="connsiteX3" fmla="*/ 1818610 w 6004547"/>
+              <a:gd name="connsiteY3" fmla="*/ 1426887 h 4829427"/>
+              <a:gd name="connsiteX4" fmla="*/ 2633849 w 6004547"/>
+              <a:gd name="connsiteY4" fmla="*/ 3841593 h 4829427"/>
+              <a:gd name="connsiteX5" fmla="*/ 2649526 w 6004547"/>
+              <a:gd name="connsiteY5" fmla="*/ 705611 h 4829427"/>
+              <a:gd name="connsiteX6" fmla="*/ 2806303 w 6004547"/>
+              <a:gd name="connsiteY6" fmla="*/ 15 h 4829427"/>
+              <a:gd name="connsiteX7" fmla="*/ 3370699 w 6004547"/>
+              <a:gd name="connsiteY7" fmla="*/ 689931 h 4829427"/>
+              <a:gd name="connsiteX8" fmla="*/ 3637220 w 6004547"/>
+              <a:gd name="connsiteY8" fmla="*/ 2163842 h 4829427"/>
+              <a:gd name="connsiteX9" fmla="*/ 4029161 w 6004547"/>
+              <a:gd name="connsiteY9" fmla="*/ 3622074 h 4829427"/>
+              <a:gd name="connsiteX10" fmla="*/ 4468136 w 6004547"/>
+              <a:gd name="connsiteY10" fmla="*/ 1520966 h 4829427"/>
+              <a:gd name="connsiteX11" fmla="*/ 4797367 w 6004547"/>
+              <a:gd name="connsiteY11" fmla="*/ 705611 h 4829427"/>
+              <a:gd name="connsiteX12" fmla="*/ 5283375 w 6004547"/>
+              <a:gd name="connsiteY12" fmla="*/ 1724805 h 4829427"/>
+              <a:gd name="connsiteX13" fmla="*/ 5659639 w 6004547"/>
+              <a:gd name="connsiteY13" fmla="*/ 1677765 h 4829427"/>
+              <a:gd name="connsiteX14" fmla="*/ 5643961 w 6004547"/>
+              <a:gd name="connsiteY14" fmla="*/ 486092 h 4829427"/>
+              <a:gd name="connsiteX15" fmla="*/ 6004547 w 6004547"/>
+              <a:gd name="connsiteY15" fmla="*/ 313613 h 4829427"/>
+              <a:gd name="connsiteX16" fmla="*/ 6004547 w 6004547"/>
+              <a:gd name="connsiteY16" fmla="*/ 313613 h 4829427"/>
+            </a:gdLst>
+            <a:ahLst/>
+            <a:cxnLst>
+              <a:cxn ang="0">
+                <a:pos x="connsiteX0" y="connsiteY0"/>
+              </a:cxn>
+              <a:cxn ang="0">
+                <a:pos x="connsiteX1" y="connsiteY1"/>
+              </a:cxn>
+              <a:cxn ang="0">
+                <a:pos x="connsiteX2" y="connsiteY2"/>
+              </a:cxn>
+              <a:cxn ang="0">
+                <a:pos x="connsiteX3" y="connsiteY3"/>
+              </a:cxn>
+              <a:cxn ang="0">
+                <a:pos x="connsiteX4" y="connsiteY4"/>
+              </a:cxn>
+              <a:cxn ang="0">
+                <a:pos x="connsiteX5" y="connsiteY5"/>
+              </a:cxn>
+              <a:cxn ang="0">
+                <a:pos x="connsiteX6" y="connsiteY6"/>
+              </a:cxn>
+              <a:cxn ang="0">
+                <a:pos x="connsiteX7" y="connsiteY7"/>
+              </a:cxn>
+              <a:cxn ang="0">
+                <a:pos x="connsiteX8" y="connsiteY8"/>
+              </a:cxn>
+              <a:cxn ang="0">
+                <a:pos x="connsiteX9" y="connsiteY9"/>
+              </a:cxn>
+              <a:cxn ang="0">
+                <a:pos x="connsiteX10" y="connsiteY10"/>
+              </a:cxn>
+              <a:cxn ang="0">
+                <a:pos x="connsiteX11" y="connsiteY11"/>
+              </a:cxn>
+              <a:cxn ang="0">
+                <a:pos x="connsiteX12" y="connsiteY12"/>
+              </a:cxn>
+              <a:cxn ang="0">
+                <a:pos x="connsiteX13" y="connsiteY13"/>
+              </a:cxn>
+              <a:cxn ang="0">
+                <a:pos x="connsiteX14" y="connsiteY14"/>
+              </a:cxn>
+              <a:cxn ang="0">
+                <a:pos x="connsiteX15" y="connsiteY15"/>
+              </a:cxn>
+              <a:cxn ang="0">
+                <a:pos x="connsiteX16" y="connsiteY16"/>
+              </a:cxn>
+            </a:cxnLst>
+            <a:rect l="l" t="t" r="r" b="b"/>
+            <a:pathLst>
+              <a:path w="6004547" h="4829427">
+                <a:moveTo>
+                  <a:pt x="0" y="4829427"/>
+                </a:moveTo>
+                <a:cubicBezTo>
+                  <a:pt x="227326" y="4541962"/>
+                  <a:pt x="454653" y="4254497"/>
+                  <a:pt x="689818" y="3967032"/>
+                </a:cubicBezTo>
+                <a:cubicBezTo>
+                  <a:pt x="924983" y="3679567"/>
+                  <a:pt x="1222859" y="3527994"/>
+                  <a:pt x="1410991" y="3104637"/>
+                </a:cubicBezTo>
+                <a:cubicBezTo>
+                  <a:pt x="1599123" y="2681280"/>
+                  <a:pt x="1614800" y="1304061"/>
+                  <a:pt x="1818610" y="1426887"/>
+                </a:cubicBezTo>
+                <a:cubicBezTo>
+                  <a:pt x="2022420" y="1549713"/>
+                  <a:pt x="2495363" y="3961806"/>
+                  <a:pt x="2633849" y="3841593"/>
+                </a:cubicBezTo>
+                <a:cubicBezTo>
+                  <a:pt x="2772335" y="3721380"/>
+                  <a:pt x="2620784" y="1345874"/>
+                  <a:pt x="2649526" y="705611"/>
+                </a:cubicBezTo>
+                <a:cubicBezTo>
+                  <a:pt x="2678268" y="65348"/>
+                  <a:pt x="2686108" y="2628"/>
+                  <a:pt x="2806303" y="15"/>
+                </a:cubicBezTo>
+                <a:cubicBezTo>
+                  <a:pt x="2926498" y="-2598"/>
+                  <a:pt x="3232213" y="329293"/>
+                  <a:pt x="3370699" y="689931"/>
+                </a:cubicBezTo>
+                <a:cubicBezTo>
+                  <a:pt x="3509185" y="1050569"/>
+                  <a:pt x="3527476" y="1675151"/>
+                  <a:pt x="3637220" y="2163842"/>
+                </a:cubicBezTo>
+                <a:cubicBezTo>
+                  <a:pt x="3746964" y="2652532"/>
+                  <a:pt x="3890675" y="3729220"/>
+                  <a:pt x="4029161" y="3622074"/>
+                </a:cubicBezTo>
+                <a:cubicBezTo>
+                  <a:pt x="4167647" y="3514928"/>
+                  <a:pt x="4340102" y="2007043"/>
+                  <a:pt x="4468136" y="1520966"/>
+                </a:cubicBezTo>
+                <a:cubicBezTo>
+                  <a:pt x="4596170" y="1034889"/>
+                  <a:pt x="4661494" y="671638"/>
+                  <a:pt x="4797367" y="705611"/>
+                </a:cubicBezTo>
+                <a:cubicBezTo>
+                  <a:pt x="4933240" y="739584"/>
+                  <a:pt x="5139663" y="1562779"/>
+                  <a:pt x="5283375" y="1724805"/>
+                </a:cubicBezTo>
+                <a:cubicBezTo>
+                  <a:pt x="5427087" y="1886831"/>
+                  <a:pt x="5599541" y="1884217"/>
+                  <a:pt x="5659639" y="1677765"/>
+                </a:cubicBezTo>
+                <a:cubicBezTo>
+                  <a:pt x="5719737" y="1471313"/>
+                  <a:pt x="5586476" y="713451"/>
+                  <a:pt x="5643961" y="486092"/>
+                </a:cubicBezTo>
+                <a:cubicBezTo>
+                  <a:pt x="5701446" y="258733"/>
+                  <a:pt x="6004547" y="313613"/>
+                  <a:pt x="6004547" y="313613"/>
+                </a:cubicBezTo>
+                <a:lnTo>
+                  <a:pt x="6004547" y="313613"/>
+                </a:lnTo>
+              </a:path>
+            </a:pathLst>
+          </a:custGeom>
+          <a:ln>
+            <a:solidFill>
+              <a:srgbClr val="3366FF"/>
+            </a:solidFill>
+          </a:ln>
+        </p:spPr>
+        <p:style>
+          <a:lnRef idx="1">
+            <a:schemeClr val="accent6"/>
+          </a:lnRef>
+          <a:fillRef idx="0">
+            <a:schemeClr val="accent6"/>
+          </a:fillRef>
+          <a:effectRef idx="0">
+            <a:schemeClr val="accent6"/>
+          </a:effectRef>
+          <a:fontRef idx="minor">
+            <a:schemeClr val="tx1"/>
+          </a:fontRef>
+        </p:style>
+        <p:txBody>
+          <a:bodyPr rtlCol="0" anchor="ctr"/>
+          <a:lstStyle/>
+          <a:p>
+            <a:pPr algn="ctr"/>
+            <a:endParaRPr lang="en-US"/>
+          </a:p>
+        </p:txBody>
+      </p:sp>
+    </p:spTree>
+    <p:extLst>
+      <p:ext uri="{BB962C8B-B14F-4D97-AF65-F5344CB8AC3E}">
+        <p14:creationId xmlns:p14="http://schemas.microsoft.com/office/powerpoint/2010/main" val="177272746"/>
       </p:ext>
     </p:extLst>
   </p:cSld>

</xml_diff>